<commit_message>
Updated Presentation with multivariate plots
</commit_message>
<xml_diff>
--- a/Analysis on Automobile Dataset.pptx
+++ b/Analysis on Automobile Dataset.pptx
@@ -5,10 +5,10 @@
     <p:sldMasterId id="2147483648" r:id="rId4"/>
   </p:sldMasterIdLst>
   <p:notesMasterIdLst>
-    <p:notesMasterId r:id="rId36"/>
+    <p:notesMasterId r:id="rId50"/>
   </p:notesMasterIdLst>
   <p:handoutMasterIdLst>
-    <p:handoutMasterId r:id="rId37"/>
+    <p:handoutMasterId r:id="rId51"/>
   </p:handoutMasterIdLst>
   <p:sldIdLst>
     <p:sldId id="268" r:id="rId5"/>
@@ -26,22 +26,36 @@
     <p:sldId id="280" r:id="rId17"/>
     <p:sldId id="283" r:id="rId18"/>
     <p:sldId id="284" r:id="rId19"/>
-    <p:sldId id="285" r:id="rId20"/>
-    <p:sldId id="286" r:id="rId21"/>
-    <p:sldId id="291" r:id="rId22"/>
-    <p:sldId id="287" r:id="rId23"/>
-    <p:sldId id="288" r:id="rId24"/>
-    <p:sldId id="289" r:id="rId25"/>
-    <p:sldId id="290" r:id="rId26"/>
-    <p:sldId id="274" r:id="rId27"/>
-    <p:sldId id="292" r:id="rId28"/>
-    <p:sldId id="293" r:id="rId29"/>
-    <p:sldId id="294" r:id="rId30"/>
-    <p:sldId id="297" r:id="rId31"/>
-    <p:sldId id="295" r:id="rId32"/>
-    <p:sldId id="296" r:id="rId33"/>
-    <p:sldId id="298" r:id="rId34"/>
-    <p:sldId id="299" r:id="rId35"/>
+    <p:sldId id="301" r:id="rId20"/>
+    <p:sldId id="285" r:id="rId21"/>
+    <p:sldId id="286" r:id="rId22"/>
+    <p:sldId id="291" r:id="rId23"/>
+    <p:sldId id="287" r:id="rId24"/>
+    <p:sldId id="288" r:id="rId25"/>
+    <p:sldId id="289" r:id="rId26"/>
+    <p:sldId id="290" r:id="rId27"/>
+    <p:sldId id="274" r:id="rId28"/>
+    <p:sldId id="310" r:id="rId29"/>
+    <p:sldId id="311" r:id="rId30"/>
+    <p:sldId id="312" r:id="rId31"/>
+    <p:sldId id="292" r:id="rId32"/>
+    <p:sldId id="293" r:id="rId33"/>
+    <p:sldId id="294" r:id="rId34"/>
+    <p:sldId id="297" r:id="rId35"/>
+    <p:sldId id="295" r:id="rId36"/>
+    <p:sldId id="296" r:id="rId37"/>
+    <p:sldId id="298" r:id="rId38"/>
+    <p:sldId id="299" r:id="rId39"/>
+    <p:sldId id="300" r:id="rId40"/>
+    <p:sldId id="302" r:id="rId41"/>
+    <p:sldId id="303" r:id="rId42"/>
+    <p:sldId id="304" r:id="rId43"/>
+    <p:sldId id="305" r:id="rId44"/>
+    <p:sldId id="306" r:id="rId45"/>
+    <p:sldId id="308" r:id="rId46"/>
+    <p:sldId id="307" r:id="rId47"/>
+    <p:sldId id="309" r:id="rId48"/>
+    <p:sldId id="313" r:id="rId49"/>
   </p:sldIdLst>
   <p:sldSz cx="12192000" cy="6858000"/>
   <p:notesSz cx="6858000" cy="9144000"/>
@@ -261,7 +275,7 @@
           <a:p>
             <a:fld id="{872BFC85-49E4-447A-A7E3-16153CB2FE2A}" type="datetimeFigureOut">
               <a:rPr lang="en-US" smtClean="0"/>
-              <a:t>05-Oct-20</a:t>
+              <a:t>20-Oct-20</a:t>
             </a:fld>
             <a:endParaRPr lang="en-US" dirty="0"/>
           </a:p>
@@ -438,7 +452,7 @@
           <a:p>
             <a:fld id="{1071B50E-4C60-4F9E-B773-52059170945B}" type="datetimeFigureOut">
               <a:rPr lang="en-US" noProof="0" smtClean="0"/>
-              <a:t>05-Oct-20</a:t>
+              <a:t>20-Oct-20</a:t>
             </a:fld>
             <a:endParaRPr lang="en-US" noProof="0" dirty="0"/>
           </a:p>
@@ -15451,17 +15465,17 @@
                   <a:schemeClr val="bg1"/>
                 </a:solidFill>
               </a:rPr>
-              <a:t>ScatterPlot of Price vs Engine capacity</a:t>
+              <a:t>ScatterPlot of Distance driven vs Year</a:t>
             </a:r>
           </a:p>
         </p:txBody>
       </p:sp>
       <p:pic>
         <p:nvPicPr>
-          <p:cNvPr id="7" name="Picture 6">
-            <a:extLst>
-              <a:ext uri="{FF2B5EF4-FFF2-40B4-BE49-F238E27FC236}">
-                <a16:creationId xmlns:a16="http://schemas.microsoft.com/office/drawing/2014/main" id="{1041E8E9-A4E9-411C-9BF5-91B00D922E56}"/>
+          <p:cNvPr id="4" name="Picture 3">
+            <a:extLst>
+              <a:ext uri="{FF2B5EF4-FFF2-40B4-BE49-F238E27FC236}">
+                <a16:creationId xmlns:a16="http://schemas.microsoft.com/office/drawing/2014/main" id="{56F224E6-516E-465C-B41F-63344B13F34C}"/>
               </a:ext>
             </a:extLst>
           </p:cNvPr>
@@ -15489,7 +15503,7 @@
     </p:spTree>
     <p:extLst>
       <p:ext uri="{BB962C8B-B14F-4D97-AF65-F5344CB8AC3E}">
-        <p14:creationId xmlns:p14="http://schemas.microsoft.com/office/powerpoint/2010/main" val="2995409461"/>
+        <p14:creationId xmlns:p14="http://schemas.microsoft.com/office/powerpoint/2010/main" val="2822277717"/>
       </p:ext>
     </p:extLst>
   </p:cSld>
@@ -15571,17 +15585,17 @@
                   <a:schemeClr val="bg1"/>
                 </a:solidFill>
               </a:rPr>
-              <a:t>ScatterPlot of Mileage vs Power HP</a:t>
+              <a:t>ScatterPlot of Price vs Engine capacity</a:t>
             </a:r>
           </a:p>
         </p:txBody>
       </p:sp>
       <p:pic>
         <p:nvPicPr>
-          <p:cNvPr id="5" name="Picture 4">
-            <a:extLst>
-              <a:ext uri="{FF2B5EF4-FFF2-40B4-BE49-F238E27FC236}">
-                <a16:creationId xmlns:a16="http://schemas.microsoft.com/office/drawing/2014/main" id="{9C6CEDFE-7184-4842-BDAD-D66CA3F4F804}"/>
+          <p:cNvPr id="7" name="Picture 6">
+            <a:extLst>
+              <a:ext uri="{FF2B5EF4-FFF2-40B4-BE49-F238E27FC236}">
+                <a16:creationId xmlns:a16="http://schemas.microsoft.com/office/drawing/2014/main" id="{1041E8E9-A4E9-411C-9BF5-91B00D922E56}"/>
               </a:ext>
             </a:extLst>
           </p:cNvPr>
@@ -15609,7 +15623,7 @@
     </p:spTree>
     <p:extLst>
       <p:ext uri="{BB962C8B-B14F-4D97-AF65-F5344CB8AC3E}">
-        <p14:creationId xmlns:p14="http://schemas.microsoft.com/office/powerpoint/2010/main" val="3292489961"/>
+        <p14:creationId xmlns:p14="http://schemas.microsoft.com/office/powerpoint/2010/main" val="2995409461"/>
       </p:ext>
     </p:extLst>
   </p:cSld>
@@ -15686,30 +15700,22 @@
           <a:p>
             <a:pPr algn="ctr"/>
             <a:r>
-              <a:rPr lang="en-US" dirty="0" err="1">
-                <a:solidFill>
-                  <a:schemeClr val="bg1"/>
-                </a:solidFill>
-              </a:rPr>
-              <a:t>ScatterPlot</a:t>
-            </a:r>
-            <a:r>
               <a:rPr lang="en-US" dirty="0">
                 <a:solidFill>
                   <a:schemeClr val="bg1"/>
                 </a:solidFill>
               </a:rPr>
-              <a:t> of Power vs Engine capacity</a:t>
+              <a:t>ScatterPlot of Mileage vs Power HP</a:t>
             </a:r>
           </a:p>
         </p:txBody>
       </p:sp>
       <p:pic>
         <p:nvPicPr>
-          <p:cNvPr id="4" name="Picture 3">
-            <a:extLst>
-              <a:ext uri="{FF2B5EF4-FFF2-40B4-BE49-F238E27FC236}">
-                <a16:creationId xmlns:a16="http://schemas.microsoft.com/office/drawing/2014/main" id="{BD2D72A8-A1FC-4A68-85D5-5D23441470CF}"/>
+          <p:cNvPr id="5" name="Picture 4">
+            <a:extLst>
+              <a:ext uri="{FF2B5EF4-FFF2-40B4-BE49-F238E27FC236}">
+                <a16:creationId xmlns:a16="http://schemas.microsoft.com/office/drawing/2014/main" id="{9C6CEDFE-7184-4842-BDAD-D66CA3F4F804}"/>
               </a:ext>
             </a:extLst>
           </p:cNvPr>
@@ -15737,7 +15743,7 @@
     </p:spTree>
     <p:extLst>
       <p:ext uri="{BB962C8B-B14F-4D97-AF65-F5344CB8AC3E}">
-        <p14:creationId xmlns:p14="http://schemas.microsoft.com/office/powerpoint/2010/main" val="2351977160"/>
+        <p14:creationId xmlns:p14="http://schemas.microsoft.com/office/powerpoint/2010/main" val="3292489961"/>
       </p:ext>
     </p:extLst>
   </p:cSld>
@@ -15819,7 +15825,7 @@
                   <a:schemeClr val="bg1"/>
                 </a:solidFill>
               </a:rPr>
-              <a:t>BoxPlot of Mileage vs Power HP &amp; Transmission</a:t>
+              <a:t>ScatterPlot of Power vs Engine capacity</a:t>
             </a:r>
           </a:p>
         </p:txBody>
@@ -15829,7 +15835,7 @@
           <p:cNvPr id="4" name="Picture 3">
             <a:extLst>
               <a:ext uri="{FF2B5EF4-FFF2-40B4-BE49-F238E27FC236}">
-                <a16:creationId xmlns:a16="http://schemas.microsoft.com/office/drawing/2014/main" id="{4F89E5BB-E5B0-4371-B074-874172B2230E}"/>
+                <a16:creationId xmlns:a16="http://schemas.microsoft.com/office/drawing/2014/main" id="{BD2D72A8-A1FC-4A68-85D5-5D23441470CF}"/>
               </a:ext>
             </a:extLst>
           </p:cNvPr>
@@ -15846,38 +15852,8 @@
         </p:blipFill>
         <p:spPr>
           <a:xfrm>
-            <a:off x="0" y="714677"/>
-            <a:ext cx="6579054" cy="6143323"/>
-          </a:xfrm>
-          <a:prstGeom prst="rect">
-            <a:avLst/>
-          </a:prstGeom>
-        </p:spPr>
-      </p:pic>
-      <p:pic>
-        <p:nvPicPr>
-          <p:cNvPr id="7" name="Picture 6">
-            <a:extLst>
-              <a:ext uri="{FF2B5EF4-FFF2-40B4-BE49-F238E27FC236}">
-                <a16:creationId xmlns:a16="http://schemas.microsoft.com/office/drawing/2014/main" id="{314F7EAE-C3C2-47E1-98B8-A190B6535345}"/>
-              </a:ext>
-            </a:extLst>
-          </p:cNvPr>
-          <p:cNvPicPr>
-            <a:picLocks noChangeAspect="1"/>
-          </p:cNvPicPr>
-          <p:nvPr/>
-        </p:nvPicPr>
-        <p:blipFill>
-          <a:blip r:embed="rId3"/>
-          <a:stretch>
-            <a:fillRect/>
-          </a:stretch>
-        </p:blipFill>
-        <p:spPr>
-          <a:xfrm>
-            <a:off x="6579054" y="714677"/>
-            <a:ext cx="5421715" cy="6143323"/>
+            <a:off x="359229" y="698120"/>
+            <a:ext cx="11832771" cy="6159880"/>
           </a:xfrm>
           <a:prstGeom prst="rect">
             <a:avLst/>
@@ -15887,7 +15863,7 @@
     </p:spTree>
     <p:extLst>
       <p:ext uri="{BB962C8B-B14F-4D97-AF65-F5344CB8AC3E}">
-        <p14:creationId xmlns:p14="http://schemas.microsoft.com/office/powerpoint/2010/main" val="4061877180"/>
+        <p14:creationId xmlns:p14="http://schemas.microsoft.com/office/powerpoint/2010/main" val="2351977160"/>
       </p:ext>
     </p:extLst>
   </p:cSld>
@@ -16256,17 +16232,17 @@
                   <a:schemeClr val="bg1"/>
                 </a:solidFill>
               </a:rPr>
-              <a:t>BoxPlot of Mileage vs Seats &amp; Ownership</a:t>
+              <a:t>BoxPlot of Mileage vs Power HP &amp; Transmission</a:t>
             </a:r>
           </a:p>
         </p:txBody>
       </p:sp>
       <p:pic>
         <p:nvPicPr>
-          <p:cNvPr id="5" name="Picture 4">
-            <a:extLst>
-              <a:ext uri="{FF2B5EF4-FFF2-40B4-BE49-F238E27FC236}">
-                <a16:creationId xmlns:a16="http://schemas.microsoft.com/office/drawing/2014/main" id="{5C0A8ACB-4EE9-4A7D-B609-06082755442E}"/>
+          <p:cNvPr id="4" name="Picture 3">
+            <a:extLst>
+              <a:ext uri="{FF2B5EF4-FFF2-40B4-BE49-F238E27FC236}">
+                <a16:creationId xmlns:a16="http://schemas.microsoft.com/office/drawing/2014/main" id="{4F89E5BB-E5B0-4371-B074-874172B2230E}"/>
               </a:ext>
             </a:extLst>
           </p:cNvPr>
@@ -16284,7 +16260,7 @@
         <p:spPr>
           <a:xfrm>
             <a:off x="0" y="714677"/>
-            <a:ext cx="6933063" cy="6143323"/>
+            <a:ext cx="6579054" cy="6143323"/>
           </a:xfrm>
           <a:prstGeom prst="rect">
             <a:avLst/>
@@ -16293,10 +16269,10 @@
       </p:pic>
       <p:pic>
         <p:nvPicPr>
-          <p:cNvPr id="8" name="Picture 7">
-            <a:extLst>
-              <a:ext uri="{FF2B5EF4-FFF2-40B4-BE49-F238E27FC236}">
-                <a16:creationId xmlns:a16="http://schemas.microsoft.com/office/drawing/2014/main" id="{883585C4-BFB0-41A5-A51A-9F6C651EF40C}"/>
+          <p:cNvPr id="7" name="Picture 6">
+            <a:extLst>
+              <a:ext uri="{FF2B5EF4-FFF2-40B4-BE49-F238E27FC236}">
+                <a16:creationId xmlns:a16="http://schemas.microsoft.com/office/drawing/2014/main" id="{314F7EAE-C3C2-47E1-98B8-A190B6535345}"/>
               </a:ext>
             </a:extLst>
           </p:cNvPr>
@@ -16313,8 +16289,8 @@
         </p:blipFill>
         <p:spPr>
           <a:xfrm>
-            <a:off x="6933063" y="714676"/>
-            <a:ext cx="5258938" cy="6143323"/>
+            <a:off x="6579054" y="714677"/>
+            <a:ext cx="5421715" cy="6143323"/>
           </a:xfrm>
           <a:prstGeom prst="rect">
             <a:avLst/>
@@ -16324,7 +16300,7 @@
     </p:spTree>
     <p:extLst>
       <p:ext uri="{BB962C8B-B14F-4D97-AF65-F5344CB8AC3E}">
-        <p14:creationId xmlns:p14="http://schemas.microsoft.com/office/powerpoint/2010/main" val="4289033197"/>
+        <p14:creationId xmlns:p14="http://schemas.microsoft.com/office/powerpoint/2010/main" val="4061877180"/>
       </p:ext>
     </p:extLst>
   </p:cSld>
@@ -16406,17 +16382,17 @@
                   <a:schemeClr val="bg1"/>
                 </a:solidFill>
               </a:rPr>
-              <a:t>BoxPlot of Price vs Fuel &amp; Ownership</a:t>
+              <a:t>BoxPlot of Mileage vs Seats &amp; Ownership</a:t>
             </a:r>
           </a:p>
         </p:txBody>
       </p:sp>
       <p:pic>
         <p:nvPicPr>
-          <p:cNvPr id="4" name="Picture 3">
-            <a:extLst>
-              <a:ext uri="{FF2B5EF4-FFF2-40B4-BE49-F238E27FC236}">
-                <a16:creationId xmlns:a16="http://schemas.microsoft.com/office/drawing/2014/main" id="{AE9A0E2B-A155-4B2E-A514-C9697B614CBA}"/>
+          <p:cNvPr id="5" name="Picture 4">
+            <a:extLst>
+              <a:ext uri="{FF2B5EF4-FFF2-40B4-BE49-F238E27FC236}">
+                <a16:creationId xmlns:a16="http://schemas.microsoft.com/office/drawing/2014/main" id="{5C0A8ACB-4EE9-4A7D-B609-06082755442E}"/>
               </a:ext>
             </a:extLst>
           </p:cNvPr>
@@ -16434,7 +16410,7 @@
         <p:spPr>
           <a:xfrm>
             <a:off x="0" y="714677"/>
-            <a:ext cx="6096000" cy="6143323"/>
+            <a:ext cx="6933063" cy="6143323"/>
           </a:xfrm>
           <a:prstGeom prst="rect">
             <a:avLst/>
@@ -16443,10 +16419,10 @@
       </p:pic>
       <p:pic>
         <p:nvPicPr>
-          <p:cNvPr id="7" name="Picture 6">
-            <a:extLst>
-              <a:ext uri="{FF2B5EF4-FFF2-40B4-BE49-F238E27FC236}">
-                <a16:creationId xmlns:a16="http://schemas.microsoft.com/office/drawing/2014/main" id="{9AECF186-E432-487A-A3F6-06A147037114}"/>
+          <p:cNvPr id="8" name="Picture 7">
+            <a:extLst>
+              <a:ext uri="{FF2B5EF4-FFF2-40B4-BE49-F238E27FC236}">
+                <a16:creationId xmlns:a16="http://schemas.microsoft.com/office/drawing/2014/main" id="{883585C4-BFB0-41A5-A51A-9F6C651EF40C}"/>
               </a:ext>
             </a:extLst>
           </p:cNvPr>
@@ -16463,8 +16439,8 @@
         </p:blipFill>
         <p:spPr>
           <a:xfrm>
-            <a:off x="6096001" y="714677"/>
-            <a:ext cx="6096000" cy="6143323"/>
+            <a:off x="6933063" y="714676"/>
+            <a:ext cx="5258938" cy="6143323"/>
           </a:xfrm>
           <a:prstGeom prst="rect">
             <a:avLst/>
@@ -16474,7 +16450,7 @@
     </p:spTree>
     <p:extLst>
       <p:ext uri="{BB962C8B-B14F-4D97-AF65-F5344CB8AC3E}">
-        <p14:creationId xmlns:p14="http://schemas.microsoft.com/office/powerpoint/2010/main" val="2373707596"/>
+        <p14:creationId xmlns:p14="http://schemas.microsoft.com/office/powerpoint/2010/main" val="4289033197"/>
       </p:ext>
     </p:extLst>
   </p:cSld>
@@ -16556,6 +16532,156 @@
                   <a:schemeClr val="bg1"/>
                 </a:solidFill>
               </a:rPr>
+              <a:t>BoxPlot of Price vs Fuel &amp; Ownership</a:t>
+            </a:r>
+          </a:p>
+        </p:txBody>
+      </p:sp>
+      <p:pic>
+        <p:nvPicPr>
+          <p:cNvPr id="4" name="Picture 3">
+            <a:extLst>
+              <a:ext uri="{FF2B5EF4-FFF2-40B4-BE49-F238E27FC236}">
+                <a16:creationId xmlns:a16="http://schemas.microsoft.com/office/drawing/2014/main" id="{AE9A0E2B-A155-4B2E-A514-C9697B614CBA}"/>
+              </a:ext>
+            </a:extLst>
+          </p:cNvPr>
+          <p:cNvPicPr>
+            <a:picLocks noChangeAspect="1"/>
+          </p:cNvPicPr>
+          <p:nvPr/>
+        </p:nvPicPr>
+        <p:blipFill>
+          <a:blip r:embed="rId2"/>
+          <a:stretch>
+            <a:fillRect/>
+          </a:stretch>
+        </p:blipFill>
+        <p:spPr>
+          <a:xfrm>
+            <a:off x="0" y="714677"/>
+            <a:ext cx="6096000" cy="6143323"/>
+          </a:xfrm>
+          <a:prstGeom prst="rect">
+            <a:avLst/>
+          </a:prstGeom>
+        </p:spPr>
+      </p:pic>
+      <p:pic>
+        <p:nvPicPr>
+          <p:cNvPr id="7" name="Picture 6">
+            <a:extLst>
+              <a:ext uri="{FF2B5EF4-FFF2-40B4-BE49-F238E27FC236}">
+                <a16:creationId xmlns:a16="http://schemas.microsoft.com/office/drawing/2014/main" id="{9AECF186-E432-487A-A3F6-06A147037114}"/>
+              </a:ext>
+            </a:extLst>
+          </p:cNvPr>
+          <p:cNvPicPr>
+            <a:picLocks noChangeAspect="1"/>
+          </p:cNvPicPr>
+          <p:nvPr/>
+        </p:nvPicPr>
+        <p:blipFill>
+          <a:blip r:embed="rId3"/>
+          <a:stretch>
+            <a:fillRect/>
+          </a:stretch>
+        </p:blipFill>
+        <p:spPr>
+          <a:xfrm>
+            <a:off x="6096001" y="714677"/>
+            <a:ext cx="6096000" cy="6143323"/>
+          </a:xfrm>
+          <a:prstGeom prst="rect">
+            <a:avLst/>
+          </a:prstGeom>
+        </p:spPr>
+      </p:pic>
+    </p:spTree>
+    <p:extLst>
+      <p:ext uri="{BB962C8B-B14F-4D97-AF65-F5344CB8AC3E}">
+        <p14:creationId xmlns:p14="http://schemas.microsoft.com/office/powerpoint/2010/main" val="2373707596"/>
+      </p:ext>
+    </p:extLst>
+  </p:cSld>
+  <p:clrMapOvr>
+    <a:masterClrMapping/>
+  </p:clrMapOvr>
+</p:sld>
+</file>
+
+<file path=ppt/slides/slide23.xml><?xml version="1.0" encoding="utf-8"?>
+<p:sld xmlns:a="http://schemas.openxmlformats.org/drawingml/2006/main" xmlns:r="http://schemas.openxmlformats.org/officeDocument/2006/relationships" xmlns:p="http://schemas.openxmlformats.org/presentationml/2006/main">
+  <p:cSld>
+    <p:spTree>
+      <p:nvGrpSpPr>
+        <p:cNvPr id="1" name=""/>
+        <p:cNvGrpSpPr/>
+        <p:nvPr/>
+      </p:nvGrpSpPr>
+      <p:grpSpPr>
+        <a:xfrm>
+          <a:off x="0" y="0"/>
+          <a:ext cx="0" cy="0"/>
+          <a:chOff x="0" y="0"/>
+          <a:chExt cx="0" cy="0"/>
+        </a:xfrm>
+      </p:grpSpPr>
+      <p:sp>
+        <p:nvSpPr>
+          <p:cNvPr id="3" name="Title 2">
+            <a:extLst>
+              <a:ext uri="{FF2B5EF4-FFF2-40B4-BE49-F238E27FC236}">
+                <a16:creationId xmlns:a16="http://schemas.microsoft.com/office/drawing/2014/main" id="{CF7BEB60-5431-4A6D-B612-E03CEF9843D2}"/>
+              </a:ext>
+            </a:extLst>
+          </p:cNvPr>
+          <p:cNvSpPr>
+            <a:spLocks noGrp="1"/>
+          </p:cNvSpPr>
+          <p:nvPr>
+            <p:ph type="title"/>
+          </p:nvPr>
+        </p:nvSpPr>
+        <p:spPr>
+          <a:xfrm>
+            <a:off x="359229" y="0"/>
+            <a:ext cx="10108604" cy="861391"/>
+          </a:xfrm>
+          <a:solidFill>
+            <a:schemeClr val="accent6">
+              <a:lumMod val="75000"/>
+            </a:schemeClr>
+          </a:solidFill>
+          <a:ln/>
+        </p:spPr>
+        <p:style>
+          <a:lnRef idx="2">
+            <a:schemeClr val="dk1">
+              <a:shade val="50000"/>
+            </a:schemeClr>
+          </a:lnRef>
+          <a:fillRef idx="1">
+            <a:schemeClr val="dk1"/>
+          </a:fillRef>
+          <a:effectRef idx="0">
+            <a:schemeClr val="dk1"/>
+          </a:effectRef>
+          <a:fontRef idx="minor">
+            <a:schemeClr val="lt1"/>
+          </a:fontRef>
+        </p:style>
+        <p:txBody>
+          <a:bodyPr/>
+          <a:lstStyle/>
+          <a:p>
+            <a:pPr algn="ctr"/>
+            <a:r>
+              <a:rPr lang="en-US" dirty="0">
+                <a:solidFill>
+                  <a:schemeClr val="bg1"/>
+                </a:solidFill>
+              </a:rPr>
               <a:t>ViolinPlot of Price vs Transmission &amp; Seats</a:t>
             </a:r>
           </a:p>
@@ -16634,7 +16760,7 @@
 </p:sld>
 </file>
 
-<file path=ppt/slides/slide23.xml><?xml version="1.0" encoding="utf-8"?>
+<file path=ppt/slides/slide24.xml><?xml version="1.0" encoding="utf-8"?>
 <p:sld xmlns:a="http://schemas.openxmlformats.org/drawingml/2006/main" xmlns:r="http://schemas.openxmlformats.org/officeDocument/2006/relationships" xmlns:p="http://schemas.openxmlformats.org/presentationml/2006/main">
   <p:cSld>
     <p:spTree>
@@ -16970,128 +17096,6 @@
 </p:sld>
 </file>
 
-<file path=ppt/slides/slide24.xml><?xml version="1.0" encoding="utf-8"?>
-<p:sld xmlns:a="http://schemas.openxmlformats.org/drawingml/2006/main" xmlns:r="http://schemas.openxmlformats.org/officeDocument/2006/relationships" xmlns:p="http://schemas.openxmlformats.org/presentationml/2006/main">
-  <p:cSld>
-    <p:spTree>
-      <p:nvGrpSpPr>
-        <p:cNvPr id="1" name=""/>
-        <p:cNvGrpSpPr/>
-        <p:nvPr/>
-      </p:nvGrpSpPr>
-      <p:grpSpPr>
-        <a:xfrm>
-          <a:off x="0" y="0"/>
-          <a:ext cx="0" cy="0"/>
-          <a:chOff x="0" y="0"/>
-          <a:chExt cx="0" cy="0"/>
-        </a:xfrm>
-      </p:grpSpPr>
-      <p:sp>
-        <p:nvSpPr>
-          <p:cNvPr id="3" name="Title 2">
-            <a:extLst>
-              <a:ext uri="{FF2B5EF4-FFF2-40B4-BE49-F238E27FC236}">
-                <a16:creationId xmlns:a16="http://schemas.microsoft.com/office/drawing/2014/main" id="{CF7BEB60-5431-4A6D-B612-E03CEF9843D2}"/>
-              </a:ext>
-            </a:extLst>
-          </p:cNvPr>
-          <p:cNvSpPr>
-            <a:spLocks noGrp="1"/>
-          </p:cNvSpPr>
-          <p:nvPr>
-            <p:ph type="title"/>
-          </p:nvPr>
-        </p:nvSpPr>
-        <p:spPr>
-          <a:xfrm>
-            <a:off x="359228" y="0"/>
-            <a:ext cx="10600319" cy="861391"/>
-          </a:xfrm>
-          <a:solidFill>
-            <a:schemeClr val="accent6">
-              <a:lumMod val="75000"/>
-            </a:schemeClr>
-          </a:solidFill>
-          <a:ln/>
-        </p:spPr>
-        <p:style>
-          <a:lnRef idx="2">
-            <a:schemeClr val="dk1">
-              <a:shade val="50000"/>
-            </a:schemeClr>
-          </a:lnRef>
-          <a:fillRef idx="1">
-            <a:schemeClr val="dk1"/>
-          </a:fillRef>
-          <a:effectRef idx="0">
-            <a:schemeClr val="dk1"/>
-          </a:effectRef>
-          <a:fontRef idx="minor">
-            <a:schemeClr val="lt1"/>
-          </a:fontRef>
-        </p:style>
-        <p:txBody>
-          <a:bodyPr>
-            <a:normAutofit fontScale="90000"/>
-          </a:bodyPr>
-          <a:lstStyle/>
-          <a:p>
-            <a:pPr algn="ctr"/>
-            <a:r>
-              <a:rPr lang="en-US" dirty="0">
-                <a:solidFill>
-                  <a:schemeClr val="bg1"/>
-                </a:solidFill>
-              </a:rPr>
-              <a:t>ScatterPlot of Mileage vs Engine Capacity vs Manufacturer </a:t>
-            </a:r>
-          </a:p>
-        </p:txBody>
-      </p:sp>
-      <p:pic>
-        <p:nvPicPr>
-          <p:cNvPr id="4" name="Picture 3">
-            <a:extLst>
-              <a:ext uri="{FF2B5EF4-FFF2-40B4-BE49-F238E27FC236}">
-                <a16:creationId xmlns:a16="http://schemas.microsoft.com/office/drawing/2014/main" id="{70FFF81A-FA4F-4631-82E8-36194CFFC851}"/>
-              </a:ext>
-            </a:extLst>
-          </p:cNvPr>
-          <p:cNvPicPr>
-            <a:picLocks noChangeAspect="1"/>
-          </p:cNvPicPr>
-          <p:nvPr/>
-        </p:nvPicPr>
-        <p:blipFill>
-          <a:blip r:embed="rId2"/>
-          <a:stretch>
-            <a:fillRect/>
-          </a:stretch>
-        </p:blipFill>
-        <p:spPr>
-          <a:xfrm>
-            <a:off x="359229" y="698120"/>
-            <a:ext cx="11832771" cy="6159880"/>
-          </a:xfrm>
-          <a:prstGeom prst="rect">
-            <a:avLst/>
-          </a:prstGeom>
-        </p:spPr>
-      </p:pic>
-    </p:spTree>
-    <p:extLst>
-      <p:ext uri="{BB962C8B-B14F-4D97-AF65-F5344CB8AC3E}">
-        <p14:creationId xmlns:p14="http://schemas.microsoft.com/office/powerpoint/2010/main" val="828985541"/>
-      </p:ext>
-    </p:extLst>
-  </p:cSld>
-  <p:clrMapOvr>
-    <a:masterClrMapping/>
-  </p:clrMapOvr>
-</p:sld>
-</file>
-
 <file path=ppt/slides/slide25.xml><?xml version="1.0" encoding="utf-8"?>
 <p:sld xmlns:a="http://schemas.openxmlformats.org/drawingml/2006/main" xmlns:r="http://schemas.openxmlformats.org/officeDocument/2006/relationships" xmlns:p="http://schemas.openxmlformats.org/presentationml/2006/main">
   <p:cSld>
@@ -17155,7 +17159,7 @@
         </p:style>
         <p:txBody>
           <a:bodyPr>
-            <a:normAutofit fontScale="90000"/>
+            <a:normAutofit/>
           </a:bodyPr>
           <a:lstStyle/>
           <a:p>
@@ -17166,7 +17170,7 @@
                   <a:schemeClr val="bg1"/>
                 </a:solidFill>
               </a:rPr>
-              <a:t>ScatterPlot of Mileage vs Engine capacity vs Model Year</a:t>
+              <a:t>Distribution of Fuel type - Citywise</a:t>
             </a:r>
           </a:p>
         </p:txBody>
@@ -17176,7 +17180,7 @@
           <p:cNvPr id="5" name="Picture 4">
             <a:extLst>
               <a:ext uri="{FF2B5EF4-FFF2-40B4-BE49-F238E27FC236}">
-                <a16:creationId xmlns:a16="http://schemas.microsoft.com/office/drawing/2014/main" id="{9484DFAE-9846-4774-8A9F-F7CA602C1D2A}"/>
+                <a16:creationId xmlns:a16="http://schemas.microsoft.com/office/drawing/2014/main" id="{B2B4AB8E-07BD-47DB-A3BF-EB0474C2EE12}"/>
               </a:ext>
             </a:extLst>
           </p:cNvPr>
@@ -17185,16 +17189,15 @@
           </p:cNvPicPr>
           <p:nvPr/>
         </p:nvPicPr>
-        <p:blipFill>
+        <p:blipFill rotWithShape="1">
           <a:blip r:embed="rId2"/>
-          <a:stretch>
-            <a:fillRect/>
-          </a:stretch>
+          <a:srcRect l="1892" b="2690"/>
+          <a:stretch/>
         </p:blipFill>
         <p:spPr>
           <a:xfrm>
-            <a:off x="359228" y="698120"/>
-            <a:ext cx="11832772" cy="6159880"/>
+            <a:off x="359227" y="711372"/>
+            <a:ext cx="11832773" cy="6146628"/>
           </a:xfrm>
           <a:prstGeom prst="rect">
             <a:avLst/>
@@ -17204,7 +17207,7 @@
     </p:spTree>
     <p:extLst>
       <p:ext uri="{BB962C8B-B14F-4D97-AF65-F5344CB8AC3E}">
-        <p14:creationId xmlns:p14="http://schemas.microsoft.com/office/powerpoint/2010/main" val="3454996519"/>
+        <p14:creationId xmlns:p14="http://schemas.microsoft.com/office/powerpoint/2010/main" val="2263424508"/>
       </p:ext>
     </p:extLst>
   </p:cSld>
@@ -17288,7 +17291,7 @@
                   <a:schemeClr val="bg1"/>
                 </a:solidFill>
               </a:rPr>
-              <a:t>ScatterPlot of Mileage vs Engine capacity vs Fuel type</a:t>
+              <a:t>Distribution of Transmission- Citywise</a:t>
             </a:r>
           </a:p>
         </p:txBody>
@@ -17298,7 +17301,7 @@
           <p:cNvPr id="4" name="Picture 3">
             <a:extLst>
               <a:ext uri="{FF2B5EF4-FFF2-40B4-BE49-F238E27FC236}">
-                <a16:creationId xmlns:a16="http://schemas.microsoft.com/office/drawing/2014/main" id="{2D93CD70-9C1E-48B3-B16A-F2744BC5897E}"/>
+                <a16:creationId xmlns:a16="http://schemas.microsoft.com/office/drawing/2014/main" id="{546AE94E-2492-4CC5-955C-A9583F0D15B7}"/>
               </a:ext>
             </a:extLst>
           </p:cNvPr>
@@ -17307,16 +17310,15 @@
           </p:cNvPicPr>
           <p:nvPr/>
         </p:nvPicPr>
-        <p:blipFill>
+        <p:blipFill rotWithShape="1">
           <a:blip r:embed="rId2"/>
-          <a:stretch>
-            <a:fillRect/>
-          </a:stretch>
+          <a:srcRect l="1556" b="2474"/>
+          <a:stretch/>
         </p:blipFill>
         <p:spPr>
           <a:xfrm>
             <a:off x="359228" y="698120"/>
-            <a:ext cx="11832772" cy="6159880"/>
+            <a:ext cx="11648661" cy="6007480"/>
           </a:xfrm>
           <a:prstGeom prst="rect">
             <a:avLst/>
@@ -17326,7 +17328,7 @@
     </p:spTree>
     <p:extLst>
       <p:ext uri="{BB962C8B-B14F-4D97-AF65-F5344CB8AC3E}">
-        <p14:creationId xmlns:p14="http://schemas.microsoft.com/office/powerpoint/2010/main" val="285500486"/>
+        <p14:creationId xmlns:p14="http://schemas.microsoft.com/office/powerpoint/2010/main" val="3871894124"/>
       </p:ext>
     </p:extLst>
   </p:cSld>
@@ -17410,7 +17412,7 @@
                   <a:schemeClr val="bg1"/>
                 </a:solidFill>
               </a:rPr>
-              <a:t>ScatterPlot of Mileage vs Power vs Manufacturer</a:t>
+              <a:t>Distribution of Transmission- Citywise</a:t>
             </a:r>
           </a:p>
         </p:txBody>
@@ -17420,7 +17422,7 @@
           <p:cNvPr id="5" name="Picture 4">
             <a:extLst>
               <a:ext uri="{FF2B5EF4-FFF2-40B4-BE49-F238E27FC236}">
-                <a16:creationId xmlns:a16="http://schemas.microsoft.com/office/drawing/2014/main" id="{FFCEB0E4-E685-4F81-863D-E7329CE1CCD1}"/>
+                <a16:creationId xmlns:a16="http://schemas.microsoft.com/office/drawing/2014/main" id="{A1EA7C21-C772-425B-BC14-F916646E85D9}"/>
               </a:ext>
             </a:extLst>
           </p:cNvPr>
@@ -17429,16 +17431,15 @@
           </p:cNvPicPr>
           <p:nvPr/>
         </p:nvPicPr>
-        <p:blipFill>
+        <p:blipFill rotWithShape="1">
           <a:blip r:embed="rId2"/>
-          <a:stretch>
-            <a:fillRect/>
-          </a:stretch>
+          <a:srcRect l="1556" b="2259"/>
+          <a:stretch/>
         </p:blipFill>
         <p:spPr>
           <a:xfrm>
             <a:off x="359228" y="698120"/>
-            <a:ext cx="11832772" cy="6159880"/>
+            <a:ext cx="11648661" cy="6020732"/>
           </a:xfrm>
           <a:prstGeom prst="rect">
             <a:avLst/>
@@ -17448,7 +17449,7 @@
     </p:spTree>
     <p:extLst>
       <p:ext uri="{BB962C8B-B14F-4D97-AF65-F5344CB8AC3E}">
-        <p14:creationId xmlns:p14="http://schemas.microsoft.com/office/powerpoint/2010/main" val="1061747950"/>
+        <p14:creationId xmlns:p14="http://schemas.microsoft.com/office/powerpoint/2010/main" val="2476765734"/>
       </p:ext>
     </p:extLst>
   </p:cSld>
@@ -17521,7 +17522,7 @@
         </p:style>
         <p:txBody>
           <a:bodyPr>
-            <a:normAutofit/>
+            <a:normAutofit fontScale="90000"/>
           </a:bodyPr>
           <a:lstStyle/>
           <a:p>
@@ -17532,17 +17533,17 @@
                   <a:schemeClr val="bg1"/>
                 </a:solidFill>
               </a:rPr>
-              <a:t>ScatterPlot of Mileage vs Power vs Model Year</a:t>
+              <a:t>ScatterPlot of Mileage vs Engine Capacity vs Manufacturer </a:t>
             </a:r>
           </a:p>
         </p:txBody>
       </p:sp>
       <p:pic>
         <p:nvPicPr>
-          <p:cNvPr id="5" name="Picture 4">
-            <a:extLst>
-              <a:ext uri="{FF2B5EF4-FFF2-40B4-BE49-F238E27FC236}">
-                <a16:creationId xmlns:a16="http://schemas.microsoft.com/office/drawing/2014/main" id="{D395360C-A14A-4B8E-8F86-349CBC958956}"/>
+          <p:cNvPr id="4" name="Picture 3">
+            <a:extLst>
+              <a:ext uri="{FF2B5EF4-FFF2-40B4-BE49-F238E27FC236}">
+                <a16:creationId xmlns:a16="http://schemas.microsoft.com/office/drawing/2014/main" id="{70FFF81A-FA4F-4631-82E8-36194CFFC851}"/>
               </a:ext>
             </a:extLst>
           </p:cNvPr>
@@ -17559,8 +17560,8 @@
         </p:blipFill>
         <p:spPr>
           <a:xfrm>
-            <a:off x="359228" y="698120"/>
-            <a:ext cx="12192000" cy="6159880"/>
+            <a:off x="359229" y="698120"/>
+            <a:ext cx="11832771" cy="6159880"/>
           </a:xfrm>
           <a:prstGeom prst="rect">
             <a:avLst/>
@@ -17570,7 +17571,7 @@
     </p:spTree>
     <p:extLst>
       <p:ext uri="{BB962C8B-B14F-4D97-AF65-F5344CB8AC3E}">
-        <p14:creationId xmlns:p14="http://schemas.microsoft.com/office/powerpoint/2010/main" val="3397218050"/>
+        <p14:creationId xmlns:p14="http://schemas.microsoft.com/office/powerpoint/2010/main" val="828985541"/>
       </p:ext>
     </p:extLst>
   </p:cSld>
@@ -17643,7 +17644,7 @@
         </p:style>
         <p:txBody>
           <a:bodyPr>
-            <a:normAutofit/>
+            <a:normAutofit fontScale="90000"/>
           </a:bodyPr>
           <a:lstStyle/>
           <a:p>
@@ -17654,17 +17655,17 @@
                   <a:schemeClr val="bg1"/>
                 </a:solidFill>
               </a:rPr>
-              <a:t>ScatterPlot of Mileage vs Power vs Fuel type</a:t>
+              <a:t>ScatterPlot of Mileage vs Engine capacity vs Model Year</a:t>
             </a:r>
           </a:p>
         </p:txBody>
       </p:sp>
       <p:pic>
         <p:nvPicPr>
-          <p:cNvPr id="4" name="Picture 3">
-            <a:extLst>
-              <a:ext uri="{FF2B5EF4-FFF2-40B4-BE49-F238E27FC236}">
-                <a16:creationId xmlns:a16="http://schemas.microsoft.com/office/drawing/2014/main" id="{B0152BA8-2AAA-47ED-8B5C-2321D82DD59B}"/>
+          <p:cNvPr id="5" name="Picture 4">
+            <a:extLst>
+              <a:ext uri="{FF2B5EF4-FFF2-40B4-BE49-F238E27FC236}">
+                <a16:creationId xmlns:a16="http://schemas.microsoft.com/office/drawing/2014/main" id="{9484DFAE-9846-4774-8A9F-F7CA602C1D2A}"/>
               </a:ext>
             </a:extLst>
           </p:cNvPr>
@@ -17692,7 +17693,7 @@
     </p:spTree>
     <p:extLst>
       <p:ext uri="{BB962C8B-B14F-4D97-AF65-F5344CB8AC3E}">
-        <p14:creationId xmlns:p14="http://schemas.microsoft.com/office/powerpoint/2010/main" val="2736175445"/>
+        <p14:creationId xmlns:p14="http://schemas.microsoft.com/office/powerpoint/2010/main" val="3454996519"/>
       </p:ext>
     </p:extLst>
   </p:cSld>
@@ -17889,17 +17890,17 @@
                   <a:schemeClr val="bg1"/>
                 </a:solidFill>
               </a:rPr>
-              <a:t>ScatterPlot of Price vs Power vs Model Year</a:t>
+              <a:t>ScatterPlot of Mileage vs Engine capacity vs Fuel type</a:t>
             </a:r>
           </a:p>
         </p:txBody>
       </p:sp>
       <p:pic>
         <p:nvPicPr>
-          <p:cNvPr id="5" name="Picture 4">
-            <a:extLst>
-              <a:ext uri="{FF2B5EF4-FFF2-40B4-BE49-F238E27FC236}">
-                <a16:creationId xmlns:a16="http://schemas.microsoft.com/office/drawing/2014/main" id="{4ADF3E63-3A3B-4CA7-BD80-ABBA09508F2A}"/>
+          <p:cNvPr id="4" name="Picture 3">
+            <a:extLst>
+              <a:ext uri="{FF2B5EF4-FFF2-40B4-BE49-F238E27FC236}">
+                <a16:creationId xmlns:a16="http://schemas.microsoft.com/office/drawing/2014/main" id="{2D93CD70-9C1E-48B3-B16A-F2744BC5897E}"/>
               </a:ext>
             </a:extLst>
           </p:cNvPr>
@@ -17927,7 +17928,7 @@
     </p:spTree>
     <p:extLst>
       <p:ext uri="{BB962C8B-B14F-4D97-AF65-F5344CB8AC3E}">
-        <p14:creationId xmlns:p14="http://schemas.microsoft.com/office/powerpoint/2010/main" val="3919347228"/>
+        <p14:creationId xmlns:p14="http://schemas.microsoft.com/office/powerpoint/2010/main" val="285500486"/>
       </p:ext>
     </p:extLst>
   </p:cSld>
@@ -18011,17 +18012,17 @@
                   <a:schemeClr val="bg1"/>
                 </a:solidFill>
               </a:rPr>
-              <a:t>ScatterPlot of Price vs Power vs Fuel type</a:t>
+              <a:t>ScatterPlot of Price vs Power vs Manufacturer</a:t>
             </a:r>
           </a:p>
         </p:txBody>
       </p:sp>
       <p:pic>
         <p:nvPicPr>
-          <p:cNvPr id="4" name="Picture 3">
-            <a:extLst>
-              <a:ext uri="{FF2B5EF4-FFF2-40B4-BE49-F238E27FC236}">
-                <a16:creationId xmlns:a16="http://schemas.microsoft.com/office/drawing/2014/main" id="{28C5FC0D-7E30-4CE1-B5E9-FCB26F3D1371}"/>
+          <p:cNvPr id="5" name="Picture 4">
+            <a:extLst>
+              <a:ext uri="{FF2B5EF4-FFF2-40B4-BE49-F238E27FC236}">
+                <a16:creationId xmlns:a16="http://schemas.microsoft.com/office/drawing/2014/main" id="{FFCEB0E4-E685-4F81-863D-E7329CE1CCD1}"/>
               </a:ext>
             </a:extLst>
           </p:cNvPr>
@@ -18049,7 +18050,983 @@
     </p:spTree>
     <p:extLst>
       <p:ext uri="{BB962C8B-B14F-4D97-AF65-F5344CB8AC3E}">
+        <p14:creationId xmlns:p14="http://schemas.microsoft.com/office/powerpoint/2010/main" val="1061747950"/>
+      </p:ext>
+    </p:extLst>
+  </p:cSld>
+  <p:clrMapOvr>
+    <a:masterClrMapping/>
+  </p:clrMapOvr>
+</p:sld>
+</file>
+
+<file path=ppt/slides/slide32.xml><?xml version="1.0" encoding="utf-8"?>
+<p:sld xmlns:a="http://schemas.openxmlformats.org/drawingml/2006/main" xmlns:r="http://schemas.openxmlformats.org/officeDocument/2006/relationships" xmlns:p="http://schemas.openxmlformats.org/presentationml/2006/main">
+  <p:cSld>
+    <p:spTree>
+      <p:nvGrpSpPr>
+        <p:cNvPr id="1" name=""/>
+        <p:cNvGrpSpPr/>
+        <p:nvPr/>
+      </p:nvGrpSpPr>
+      <p:grpSpPr>
+        <a:xfrm>
+          <a:off x="0" y="0"/>
+          <a:ext cx="0" cy="0"/>
+          <a:chOff x="0" y="0"/>
+          <a:chExt cx="0" cy="0"/>
+        </a:xfrm>
+      </p:grpSpPr>
+      <p:sp>
+        <p:nvSpPr>
+          <p:cNvPr id="3" name="Title 2">
+            <a:extLst>
+              <a:ext uri="{FF2B5EF4-FFF2-40B4-BE49-F238E27FC236}">
+                <a16:creationId xmlns:a16="http://schemas.microsoft.com/office/drawing/2014/main" id="{CF7BEB60-5431-4A6D-B612-E03CEF9843D2}"/>
+              </a:ext>
+            </a:extLst>
+          </p:cNvPr>
+          <p:cNvSpPr>
+            <a:spLocks noGrp="1"/>
+          </p:cNvSpPr>
+          <p:nvPr>
+            <p:ph type="title"/>
+          </p:nvPr>
+        </p:nvSpPr>
+        <p:spPr>
+          <a:xfrm>
+            <a:off x="359228" y="0"/>
+            <a:ext cx="10600319" cy="861391"/>
+          </a:xfrm>
+          <a:solidFill>
+            <a:schemeClr val="accent6">
+              <a:lumMod val="75000"/>
+            </a:schemeClr>
+          </a:solidFill>
+          <a:ln/>
+        </p:spPr>
+        <p:style>
+          <a:lnRef idx="2">
+            <a:schemeClr val="dk1">
+              <a:shade val="50000"/>
+            </a:schemeClr>
+          </a:lnRef>
+          <a:fillRef idx="1">
+            <a:schemeClr val="dk1"/>
+          </a:fillRef>
+          <a:effectRef idx="0">
+            <a:schemeClr val="dk1"/>
+          </a:effectRef>
+          <a:fontRef idx="minor">
+            <a:schemeClr val="lt1"/>
+          </a:fontRef>
+        </p:style>
+        <p:txBody>
+          <a:bodyPr>
+            <a:normAutofit/>
+          </a:bodyPr>
+          <a:lstStyle/>
+          <a:p>
+            <a:pPr algn="ctr"/>
+            <a:r>
+              <a:rPr lang="en-US" dirty="0">
+                <a:solidFill>
+                  <a:schemeClr val="bg1"/>
+                </a:solidFill>
+              </a:rPr>
+              <a:t>ScatterPlot of Mileage vs Power vs Model Year</a:t>
+            </a:r>
+          </a:p>
+        </p:txBody>
+      </p:sp>
+      <p:pic>
+        <p:nvPicPr>
+          <p:cNvPr id="5" name="Picture 4">
+            <a:extLst>
+              <a:ext uri="{FF2B5EF4-FFF2-40B4-BE49-F238E27FC236}">
+                <a16:creationId xmlns:a16="http://schemas.microsoft.com/office/drawing/2014/main" id="{D395360C-A14A-4B8E-8F86-349CBC958956}"/>
+              </a:ext>
+            </a:extLst>
+          </p:cNvPr>
+          <p:cNvPicPr>
+            <a:picLocks noChangeAspect="1"/>
+          </p:cNvPicPr>
+          <p:nvPr/>
+        </p:nvPicPr>
+        <p:blipFill>
+          <a:blip r:embed="rId2"/>
+          <a:stretch>
+            <a:fillRect/>
+          </a:stretch>
+        </p:blipFill>
+        <p:spPr>
+          <a:xfrm>
+            <a:off x="359228" y="698120"/>
+            <a:ext cx="12192000" cy="6159880"/>
+          </a:xfrm>
+          <a:prstGeom prst="rect">
+            <a:avLst/>
+          </a:prstGeom>
+        </p:spPr>
+      </p:pic>
+    </p:spTree>
+    <p:extLst>
+      <p:ext uri="{BB962C8B-B14F-4D97-AF65-F5344CB8AC3E}">
+        <p14:creationId xmlns:p14="http://schemas.microsoft.com/office/powerpoint/2010/main" val="3397218050"/>
+      </p:ext>
+    </p:extLst>
+  </p:cSld>
+  <p:clrMapOvr>
+    <a:masterClrMapping/>
+  </p:clrMapOvr>
+</p:sld>
+</file>
+
+<file path=ppt/slides/slide33.xml><?xml version="1.0" encoding="utf-8"?>
+<p:sld xmlns:a="http://schemas.openxmlformats.org/drawingml/2006/main" xmlns:r="http://schemas.openxmlformats.org/officeDocument/2006/relationships" xmlns:p="http://schemas.openxmlformats.org/presentationml/2006/main">
+  <p:cSld>
+    <p:spTree>
+      <p:nvGrpSpPr>
+        <p:cNvPr id="1" name=""/>
+        <p:cNvGrpSpPr/>
+        <p:nvPr/>
+      </p:nvGrpSpPr>
+      <p:grpSpPr>
+        <a:xfrm>
+          <a:off x="0" y="0"/>
+          <a:ext cx="0" cy="0"/>
+          <a:chOff x="0" y="0"/>
+          <a:chExt cx="0" cy="0"/>
+        </a:xfrm>
+      </p:grpSpPr>
+      <p:sp>
+        <p:nvSpPr>
+          <p:cNvPr id="3" name="Title 2">
+            <a:extLst>
+              <a:ext uri="{FF2B5EF4-FFF2-40B4-BE49-F238E27FC236}">
+                <a16:creationId xmlns:a16="http://schemas.microsoft.com/office/drawing/2014/main" id="{CF7BEB60-5431-4A6D-B612-E03CEF9843D2}"/>
+              </a:ext>
+            </a:extLst>
+          </p:cNvPr>
+          <p:cNvSpPr>
+            <a:spLocks noGrp="1"/>
+          </p:cNvSpPr>
+          <p:nvPr>
+            <p:ph type="title"/>
+          </p:nvPr>
+        </p:nvSpPr>
+        <p:spPr>
+          <a:xfrm>
+            <a:off x="359228" y="0"/>
+            <a:ext cx="10600319" cy="861391"/>
+          </a:xfrm>
+          <a:solidFill>
+            <a:schemeClr val="accent6">
+              <a:lumMod val="75000"/>
+            </a:schemeClr>
+          </a:solidFill>
+          <a:ln/>
+        </p:spPr>
+        <p:style>
+          <a:lnRef idx="2">
+            <a:schemeClr val="dk1">
+              <a:shade val="50000"/>
+            </a:schemeClr>
+          </a:lnRef>
+          <a:fillRef idx="1">
+            <a:schemeClr val="dk1"/>
+          </a:fillRef>
+          <a:effectRef idx="0">
+            <a:schemeClr val="dk1"/>
+          </a:effectRef>
+          <a:fontRef idx="minor">
+            <a:schemeClr val="lt1"/>
+          </a:fontRef>
+        </p:style>
+        <p:txBody>
+          <a:bodyPr>
+            <a:normAutofit/>
+          </a:bodyPr>
+          <a:lstStyle/>
+          <a:p>
+            <a:pPr algn="ctr"/>
+            <a:r>
+              <a:rPr lang="en-US" dirty="0">
+                <a:solidFill>
+                  <a:schemeClr val="bg1"/>
+                </a:solidFill>
+              </a:rPr>
+              <a:t>ScatterPlot of Mileage vs Power vs Fuel type</a:t>
+            </a:r>
+          </a:p>
+        </p:txBody>
+      </p:sp>
+      <p:pic>
+        <p:nvPicPr>
+          <p:cNvPr id="4" name="Picture 3">
+            <a:extLst>
+              <a:ext uri="{FF2B5EF4-FFF2-40B4-BE49-F238E27FC236}">
+                <a16:creationId xmlns:a16="http://schemas.microsoft.com/office/drawing/2014/main" id="{B0152BA8-2AAA-47ED-8B5C-2321D82DD59B}"/>
+              </a:ext>
+            </a:extLst>
+          </p:cNvPr>
+          <p:cNvPicPr>
+            <a:picLocks noChangeAspect="1"/>
+          </p:cNvPicPr>
+          <p:nvPr/>
+        </p:nvPicPr>
+        <p:blipFill>
+          <a:blip r:embed="rId2"/>
+          <a:stretch>
+            <a:fillRect/>
+          </a:stretch>
+        </p:blipFill>
+        <p:spPr>
+          <a:xfrm>
+            <a:off x="359228" y="698120"/>
+            <a:ext cx="11832772" cy="6159880"/>
+          </a:xfrm>
+          <a:prstGeom prst="rect">
+            <a:avLst/>
+          </a:prstGeom>
+        </p:spPr>
+      </p:pic>
+    </p:spTree>
+    <p:extLst>
+      <p:ext uri="{BB962C8B-B14F-4D97-AF65-F5344CB8AC3E}">
+        <p14:creationId xmlns:p14="http://schemas.microsoft.com/office/powerpoint/2010/main" val="2736175445"/>
+      </p:ext>
+    </p:extLst>
+  </p:cSld>
+  <p:clrMapOvr>
+    <a:masterClrMapping/>
+  </p:clrMapOvr>
+</p:sld>
+</file>
+
+<file path=ppt/slides/slide34.xml><?xml version="1.0" encoding="utf-8"?>
+<p:sld xmlns:a="http://schemas.openxmlformats.org/drawingml/2006/main" xmlns:r="http://schemas.openxmlformats.org/officeDocument/2006/relationships" xmlns:p="http://schemas.openxmlformats.org/presentationml/2006/main">
+  <p:cSld>
+    <p:spTree>
+      <p:nvGrpSpPr>
+        <p:cNvPr id="1" name=""/>
+        <p:cNvGrpSpPr/>
+        <p:nvPr/>
+      </p:nvGrpSpPr>
+      <p:grpSpPr>
+        <a:xfrm>
+          <a:off x="0" y="0"/>
+          <a:ext cx="0" cy="0"/>
+          <a:chOff x="0" y="0"/>
+          <a:chExt cx="0" cy="0"/>
+        </a:xfrm>
+      </p:grpSpPr>
+      <p:sp>
+        <p:nvSpPr>
+          <p:cNvPr id="3" name="Title 2">
+            <a:extLst>
+              <a:ext uri="{FF2B5EF4-FFF2-40B4-BE49-F238E27FC236}">
+                <a16:creationId xmlns:a16="http://schemas.microsoft.com/office/drawing/2014/main" id="{CF7BEB60-5431-4A6D-B612-E03CEF9843D2}"/>
+              </a:ext>
+            </a:extLst>
+          </p:cNvPr>
+          <p:cNvSpPr>
+            <a:spLocks noGrp="1"/>
+          </p:cNvSpPr>
+          <p:nvPr>
+            <p:ph type="title"/>
+          </p:nvPr>
+        </p:nvSpPr>
+        <p:spPr>
+          <a:xfrm>
+            <a:off x="359228" y="0"/>
+            <a:ext cx="10600319" cy="861391"/>
+          </a:xfrm>
+          <a:solidFill>
+            <a:schemeClr val="accent6">
+              <a:lumMod val="75000"/>
+            </a:schemeClr>
+          </a:solidFill>
+          <a:ln/>
+        </p:spPr>
+        <p:style>
+          <a:lnRef idx="2">
+            <a:schemeClr val="dk1">
+              <a:shade val="50000"/>
+            </a:schemeClr>
+          </a:lnRef>
+          <a:fillRef idx="1">
+            <a:schemeClr val="dk1"/>
+          </a:fillRef>
+          <a:effectRef idx="0">
+            <a:schemeClr val="dk1"/>
+          </a:effectRef>
+          <a:fontRef idx="minor">
+            <a:schemeClr val="lt1"/>
+          </a:fontRef>
+        </p:style>
+        <p:txBody>
+          <a:bodyPr>
+            <a:normAutofit/>
+          </a:bodyPr>
+          <a:lstStyle/>
+          <a:p>
+            <a:pPr algn="ctr"/>
+            <a:r>
+              <a:rPr lang="en-US" dirty="0">
+                <a:solidFill>
+                  <a:schemeClr val="bg1"/>
+                </a:solidFill>
+              </a:rPr>
+              <a:t>ScatterPlot of Price vs Power vs Model Year</a:t>
+            </a:r>
+          </a:p>
+        </p:txBody>
+      </p:sp>
+      <p:pic>
+        <p:nvPicPr>
+          <p:cNvPr id="5" name="Picture 4">
+            <a:extLst>
+              <a:ext uri="{FF2B5EF4-FFF2-40B4-BE49-F238E27FC236}">
+                <a16:creationId xmlns:a16="http://schemas.microsoft.com/office/drawing/2014/main" id="{4ADF3E63-3A3B-4CA7-BD80-ABBA09508F2A}"/>
+              </a:ext>
+            </a:extLst>
+          </p:cNvPr>
+          <p:cNvPicPr>
+            <a:picLocks noChangeAspect="1"/>
+          </p:cNvPicPr>
+          <p:nvPr/>
+        </p:nvPicPr>
+        <p:blipFill>
+          <a:blip r:embed="rId2"/>
+          <a:stretch>
+            <a:fillRect/>
+          </a:stretch>
+        </p:blipFill>
+        <p:spPr>
+          <a:xfrm>
+            <a:off x="359228" y="698120"/>
+            <a:ext cx="11832772" cy="6159880"/>
+          </a:xfrm>
+          <a:prstGeom prst="rect">
+            <a:avLst/>
+          </a:prstGeom>
+        </p:spPr>
+      </p:pic>
+    </p:spTree>
+    <p:extLst>
+      <p:ext uri="{BB962C8B-B14F-4D97-AF65-F5344CB8AC3E}">
+        <p14:creationId xmlns:p14="http://schemas.microsoft.com/office/powerpoint/2010/main" val="3919347228"/>
+      </p:ext>
+    </p:extLst>
+  </p:cSld>
+  <p:clrMapOvr>
+    <a:masterClrMapping/>
+  </p:clrMapOvr>
+</p:sld>
+</file>
+
+<file path=ppt/slides/slide35.xml><?xml version="1.0" encoding="utf-8"?>
+<p:sld xmlns:a="http://schemas.openxmlformats.org/drawingml/2006/main" xmlns:r="http://schemas.openxmlformats.org/officeDocument/2006/relationships" xmlns:p="http://schemas.openxmlformats.org/presentationml/2006/main">
+  <p:cSld>
+    <p:spTree>
+      <p:nvGrpSpPr>
+        <p:cNvPr id="1" name=""/>
+        <p:cNvGrpSpPr/>
+        <p:nvPr/>
+      </p:nvGrpSpPr>
+      <p:grpSpPr>
+        <a:xfrm>
+          <a:off x="0" y="0"/>
+          <a:ext cx="0" cy="0"/>
+          <a:chOff x="0" y="0"/>
+          <a:chExt cx="0" cy="0"/>
+        </a:xfrm>
+      </p:grpSpPr>
+      <p:sp>
+        <p:nvSpPr>
+          <p:cNvPr id="3" name="Title 2">
+            <a:extLst>
+              <a:ext uri="{FF2B5EF4-FFF2-40B4-BE49-F238E27FC236}">
+                <a16:creationId xmlns:a16="http://schemas.microsoft.com/office/drawing/2014/main" id="{CF7BEB60-5431-4A6D-B612-E03CEF9843D2}"/>
+              </a:ext>
+            </a:extLst>
+          </p:cNvPr>
+          <p:cNvSpPr>
+            <a:spLocks noGrp="1"/>
+          </p:cNvSpPr>
+          <p:nvPr>
+            <p:ph type="title"/>
+          </p:nvPr>
+        </p:nvSpPr>
+        <p:spPr>
+          <a:xfrm>
+            <a:off x="359228" y="0"/>
+            <a:ext cx="10600319" cy="861391"/>
+          </a:xfrm>
+          <a:solidFill>
+            <a:schemeClr val="accent6">
+              <a:lumMod val="75000"/>
+            </a:schemeClr>
+          </a:solidFill>
+          <a:ln/>
+        </p:spPr>
+        <p:style>
+          <a:lnRef idx="2">
+            <a:schemeClr val="dk1">
+              <a:shade val="50000"/>
+            </a:schemeClr>
+          </a:lnRef>
+          <a:fillRef idx="1">
+            <a:schemeClr val="dk1"/>
+          </a:fillRef>
+          <a:effectRef idx="0">
+            <a:schemeClr val="dk1"/>
+          </a:effectRef>
+          <a:fontRef idx="minor">
+            <a:schemeClr val="lt1"/>
+          </a:fontRef>
+        </p:style>
+        <p:txBody>
+          <a:bodyPr>
+            <a:normAutofit/>
+          </a:bodyPr>
+          <a:lstStyle/>
+          <a:p>
+            <a:pPr algn="ctr"/>
+            <a:r>
+              <a:rPr lang="en-US" dirty="0">
+                <a:solidFill>
+                  <a:schemeClr val="bg1"/>
+                </a:solidFill>
+              </a:rPr>
+              <a:t>ScatterPlot of Price vs Power vs Fuel type</a:t>
+            </a:r>
+          </a:p>
+        </p:txBody>
+      </p:sp>
+      <p:pic>
+        <p:nvPicPr>
+          <p:cNvPr id="4" name="Picture 3">
+            <a:extLst>
+              <a:ext uri="{FF2B5EF4-FFF2-40B4-BE49-F238E27FC236}">
+                <a16:creationId xmlns:a16="http://schemas.microsoft.com/office/drawing/2014/main" id="{28C5FC0D-7E30-4CE1-B5E9-FCB26F3D1371}"/>
+              </a:ext>
+            </a:extLst>
+          </p:cNvPr>
+          <p:cNvPicPr>
+            <a:picLocks noChangeAspect="1"/>
+          </p:cNvPicPr>
+          <p:nvPr/>
+        </p:nvPicPr>
+        <p:blipFill>
+          <a:blip r:embed="rId2"/>
+          <a:stretch>
+            <a:fillRect/>
+          </a:stretch>
+        </p:blipFill>
+        <p:spPr>
+          <a:xfrm>
+            <a:off x="359228" y="698120"/>
+            <a:ext cx="11832772" cy="6159880"/>
+          </a:xfrm>
+          <a:prstGeom prst="rect">
+            <a:avLst/>
+          </a:prstGeom>
+        </p:spPr>
+      </p:pic>
+    </p:spTree>
+    <p:extLst>
+      <p:ext uri="{BB962C8B-B14F-4D97-AF65-F5344CB8AC3E}">
         <p14:creationId xmlns:p14="http://schemas.microsoft.com/office/powerpoint/2010/main" val="433609885"/>
+      </p:ext>
+    </p:extLst>
+  </p:cSld>
+  <p:clrMapOvr>
+    <a:masterClrMapping/>
+  </p:clrMapOvr>
+</p:sld>
+</file>
+
+<file path=ppt/slides/slide36.xml><?xml version="1.0" encoding="utf-8"?>
+<p:sld xmlns:a="http://schemas.openxmlformats.org/drawingml/2006/main" xmlns:r="http://schemas.openxmlformats.org/officeDocument/2006/relationships" xmlns:p="http://schemas.openxmlformats.org/presentationml/2006/main">
+  <p:cSld>
+    <p:spTree>
+      <p:nvGrpSpPr>
+        <p:cNvPr id="1" name=""/>
+        <p:cNvGrpSpPr/>
+        <p:nvPr/>
+      </p:nvGrpSpPr>
+      <p:grpSpPr>
+        <a:xfrm>
+          <a:off x="0" y="0"/>
+          <a:ext cx="0" cy="0"/>
+          <a:chOff x="0" y="0"/>
+          <a:chExt cx="0" cy="0"/>
+        </a:xfrm>
+      </p:grpSpPr>
+      <p:sp>
+        <p:nvSpPr>
+          <p:cNvPr id="3" name="Title 2">
+            <a:extLst>
+              <a:ext uri="{FF2B5EF4-FFF2-40B4-BE49-F238E27FC236}">
+                <a16:creationId xmlns:a16="http://schemas.microsoft.com/office/drawing/2014/main" id="{CF7BEB60-5431-4A6D-B612-E03CEF9843D2}"/>
+              </a:ext>
+            </a:extLst>
+          </p:cNvPr>
+          <p:cNvSpPr>
+            <a:spLocks noGrp="1"/>
+          </p:cNvSpPr>
+          <p:nvPr>
+            <p:ph type="title"/>
+          </p:nvPr>
+        </p:nvSpPr>
+        <p:spPr>
+          <a:xfrm>
+            <a:off x="359228" y="0"/>
+            <a:ext cx="10600319" cy="861391"/>
+          </a:xfrm>
+          <a:solidFill>
+            <a:schemeClr val="accent6">
+              <a:lumMod val="75000"/>
+            </a:schemeClr>
+          </a:solidFill>
+          <a:ln/>
+        </p:spPr>
+        <p:style>
+          <a:lnRef idx="2">
+            <a:schemeClr val="dk1">
+              <a:shade val="50000"/>
+            </a:schemeClr>
+          </a:lnRef>
+          <a:fillRef idx="1">
+            <a:schemeClr val="dk1"/>
+          </a:fillRef>
+          <a:effectRef idx="0">
+            <a:schemeClr val="dk1"/>
+          </a:effectRef>
+          <a:fontRef idx="minor">
+            <a:schemeClr val="lt1"/>
+          </a:fontRef>
+        </p:style>
+        <p:txBody>
+          <a:bodyPr>
+            <a:normAutofit/>
+          </a:bodyPr>
+          <a:lstStyle/>
+          <a:p>
+            <a:pPr algn="ctr"/>
+            <a:r>
+              <a:rPr lang="en-US" dirty="0">
+                <a:solidFill>
+                  <a:schemeClr val="bg1"/>
+                </a:solidFill>
+              </a:rPr>
+              <a:t>ScatterPlot of Price vs Power vs Transmission</a:t>
+            </a:r>
+          </a:p>
+        </p:txBody>
+      </p:sp>
+      <p:pic>
+        <p:nvPicPr>
+          <p:cNvPr id="11" name="Picture 10">
+            <a:extLst>
+              <a:ext uri="{FF2B5EF4-FFF2-40B4-BE49-F238E27FC236}">
+                <a16:creationId xmlns:a16="http://schemas.microsoft.com/office/drawing/2014/main" id="{FDBFA44C-D68D-445A-BCD9-796969F1A5C2}"/>
+              </a:ext>
+            </a:extLst>
+          </p:cNvPr>
+          <p:cNvPicPr>
+            <a:picLocks noChangeAspect="1"/>
+          </p:cNvPicPr>
+          <p:nvPr/>
+        </p:nvPicPr>
+        <p:blipFill>
+          <a:blip r:embed="rId2"/>
+          <a:stretch>
+            <a:fillRect/>
+          </a:stretch>
+        </p:blipFill>
+        <p:spPr>
+          <a:xfrm>
+            <a:off x="359228" y="698120"/>
+            <a:ext cx="11832772" cy="6159880"/>
+          </a:xfrm>
+          <a:prstGeom prst="rect">
+            <a:avLst/>
+          </a:prstGeom>
+        </p:spPr>
+      </p:pic>
+    </p:spTree>
+    <p:extLst>
+      <p:ext uri="{BB962C8B-B14F-4D97-AF65-F5344CB8AC3E}">
+        <p14:creationId xmlns:p14="http://schemas.microsoft.com/office/powerpoint/2010/main" val="810329322"/>
+      </p:ext>
+    </p:extLst>
+  </p:cSld>
+  <p:clrMapOvr>
+    <a:masterClrMapping/>
+  </p:clrMapOvr>
+</p:sld>
+</file>
+
+<file path=ppt/slides/slide37.xml><?xml version="1.0" encoding="utf-8"?>
+<p:sld xmlns:a="http://schemas.openxmlformats.org/drawingml/2006/main" xmlns:r="http://schemas.openxmlformats.org/officeDocument/2006/relationships" xmlns:p="http://schemas.openxmlformats.org/presentationml/2006/main">
+  <p:cSld>
+    <p:spTree>
+      <p:nvGrpSpPr>
+        <p:cNvPr id="1" name=""/>
+        <p:cNvGrpSpPr/>
+        <p:nvPr/>
+      </p:nvGrpSpPr>
+      <p:grpSpPr>
+        <a:xfrm>
+          <a:off x="0" y="0"/>
+          <a:ext cx="0" cy="0"/>
+          <a:chOff x="0" y="0"/>
+          <a:chExt cx="0" cy="0"/>
+        </a:xfrm>
+      </p:grpSpPr>
+      <p:sp>
+        <p:nvSpPr>
+          <p:cNvPr id="3" name="Title 2">
+            <a:extLst>
+              <a:ext uri="{FF2B5EF4-FFF2-40B4-BE49-F238E27FC236}">
+                <a16:creationId xmlns:a16="http://schemas.microsoft.com/office/drawing/2014/main" id="{CF7BEB60-5431-4A6D-B612-E03CEF9843D2}"/>
+              </a:ext>
+            </a:extLst>
+          </p:cNvPr>
+          <p:cNvSpPr>
+            <a:spLocks noGrp="1"/>
+          </p:cNvSpPr>
+          <p:nvPr>
+            <p:ph type="title"/>
+          </p:nvPr>
+        </p:nvSpPr>
+        <p:spPr>
+          <a:xfrm>
+            <a:off x="359228" y="0"/>
+            <a:ext cx="10600319" cy="861391"/>
+          </a:xfrm>
+          <a:solidFill>
+            <a:schemeClr val="accent6">
+              <a:lumMod val="75000"/>
+            </a:schemeClr>
+          </a:solidFill>
+          <a:ln/>
+        </p:spPr>
+        <p:style>
+          <a:lnRef idx="2">
+            <a:schemeClr val="dk1">
+              <a:shade val="50000"/>
+            </a:schemeClr>
+          </a:lnRef>
+          <a:fillRef idx="1">
+            <a:schemeClr val="dk1"/>
+          </a:fillRef>
+          <a:effectRef idx="0">
+            <a:schemeClr val="dk1"/>
+          </a:effectRef>
+          <a:fontRef idx="minor">
+            <a:schemeClr val="lt1"/>
+          </a:fontRef>
+        </p:style>
+        <p:txBody>
+          <a:bodyPr>
+            <a:normAutofit fontScale="90000"/>
+          </a:bodyPr>
+          <a:lstStyle/>
+          <a:p>
+            <a:pPr algn="ctr"/>
+            <a:r>
+              <a:rPr lang="en-US" dirty="0">
+                <a:solidFill>
+                  <a:schemeClr val="bg1"/>
+                </a:solidFill>
+              </a:rPr>
+              <a:t>ScatterPlot of Distance vs Year vs Fuel type vs Transmission</a:t>
+            </a:r>
+          </a:p>
+        </p:txBody>
+      </p:sp>
+      <p:pic>
+        <p:nvPicPr>
+          <p:cNvPr id="4" name="Picture 3">
+            <a:extLst>
+              <a:ext uri="{FF2B5EF4-FFF2-40B4-BE49-F238E27FC236}">
+                <a16:creationId xmlns:a16="http://schemas.microsoft.com/office/drawing/2014/main" id="{945841E7-785D-47A0-804F-1E4B64CBC220}"/>
+              </a:ext>
+            </a:extLst>
+          </p:cNvPr>
+          <p:cNvPicPr>
+            <a:picLocks noChangeAspect="1"/>
+          </p:cNvPicPr>
+          <p:nvPr/>
+        </p:nvPicPr>
+        <p:blipFill>
+          <a:blip r:embed="rId2"/>
+          <a:stretch>
+            <a:fillRect/>
+          </a:stretch>
+        </p:blipFill>
+        <p:spPr>
+          <a:xfrm>
+            <a:off x="359228" y="698120"/>
+            <a:ext cx="11832772" cy="6159880"/>
+          </a:xfrm>
+          <a:prstGeom prst="rect">
+            <a:avLst/>
+          </a:prstGeom>
+        </p:spPr>
+      </p:pic>
+    </p:spTree>
+    <p:extLst>
+      <p:ext uri="{BB962C8B-B14F-4D97-AF65-F5344CB8AC3E}">
+        <p14:creationId xmlns:p14="http://schemas.microsoft.com/office/powerpoint/2010/main" val="1453505489"/>
+      </p:ext>
+    </p:extLst>
+  </p:cSld>
+  <p:clrMapOvr>
+    <a:masterClrMapping/>
+  </p:clrMapOvr>
+</p:sld>
+</file>
+
+<file path=ppt/slides/slide38.xml><?xml version="1.0" encoding="utf-8"?>
+<p:sld xmlns:a="http://schemas.openxmlformats.org/drawingml/2006/main" xmlns:r="http://schemas.openxmlformats.org/officeDocument/2006/relationships" xmlns:p="http://schemas.openxmlformats.org/presentationml/2006/main">
+  <p:cSld>
+    <p:spTree>
+      <p:nvGrpSpPr>
+        <p:cNvPr id="1" name=""/>
+        <p:cNvGrpSpPr/>
+        <p:nvPr/>
+      </p:nvGrpSpPr>
+      <p:grpSpPr>
+        <a:xfrm>
+          <a:off x="0" y="0"/>
+          <a:ext cx="0" cy="0"/>
+          <a:chOff x="0" y="0"/>
+          <a:chExt cx="0" cy="0"/>
+        </a:xfrm>
+      </p:grpSpPr>
+      <p:sp>
+        <p:nvSpPr>
+          <p:cNvPr id="3" name="Title 2">
+            <a:extLst>
+              <a:ext uri="{FF2B5EF4-FFF2-40B4-BE49-F238E27FC236}">
+                <a16:creationId xmlns:a16="http://schemas.microsoft.com/office/drawing/2014/main" id="{CF7BEB60-5431-4A6D-B612-E03CEF9843D2}"/>
+              </a:ext>
+            </a:extLst>
+          </p:cNvPr>
+          <p:cNvSpPr>
+            <a:spLocks noGrp="1"/>
+          </p:cNvSpPr>
+          <p:nvPr>
+            <p:ph type="title"/>
+          </p:nvPr>
+        </p:nvSpPr>
+        <p:spPr>
+          <a:xfrm>
+            <a:off x="359228" y="0"/>
+            <a:ext cx="10600319" cy="861391"/>
+          </a:xfrm>
+          <a:solidFill>
+            <a:schemeClr val="accent6">
+              <a:lumMod val="75000"/>
+            </a:schemeClr>
+          </a:solidFill>
+          <a:ln/>
+        </p:spPr>
+        <p:style>
+          <a:lnRef idx="2">
+            <a:schemeClr val="dk1">
+              <a:shade val="50000"/>
+            </a:schemeClr>
+          </a:lnRef>
+          <a:fillRef idx="1">
+            <a:schemeClr val="dk1"/>
+          </a:fillRef>
+          <a:effectRef idx="0">
+            <a:schemeClr val="dk1"/>
+          </a:effectRef>
+          <a:fontRef idx="minor">
+            <a:schemeClr val="lt1"/>
+          </a:fontRef>
+        </p:style>
+        <p:txBody>
+          <a:bodyPr>
+            <a:noAutofit/>
+          </a:bodyPr>
+          <a:lstStyle/>
+          <a:p>
+            <a:pPr algn="ctr"/>
+            <a:r>
+              <a:rPr lang="en-US" sz="3000" dirty="0">
+                <a:solidFill>
+                  <a:schemeClr val="bg1"/>
+                </a:solidFill>
+              </a:rPr>
+              <a:t>ScatterPlot of Mileage vs Engine vs Fuel type vs Transmission</a:t>
+            </a:r>
+          </a:p>
+        </p:txBody>
+      </p:sp>
+      <p:pic>
+        <p:nvPicPr>
+          <p:cNvPr id="5" name="Picture 4">
+            <a:extLst>
+              <a:ext uri="{FF2B5EF4-FFF2-40B4-BE49-F238E27FC236}">
+                <a16:creationId xmlns:a16="http://schemas.microsoft.com/office/drawing/2014/main" id="{A4F2C41C-3AB9-46A1-AFA4-0B349C9AC86E}"/>
+              </a:ext>
+            </a:extLst>
+          </p:cNvPr>
+          <p:cNvPicPr>
+            <a:picLocks noChangeAspect="1"/>
+          </p:cNvPicPr>
+          <p:nvPr/>
+        </p:nvPicPr>
+        <p:blipFill>
+          <a:blip r:embed="rId2"/>
+          <a:stretch>
+            <a:fillRect/>
+          </a:stretch>
+        </p:blipFill>
+        <p:spPr>
+          <a:xfrm>
+            <a:off x="359228" y="698120"/>
+            <a:ext cx="11832772" cy="6159880"/>
+          </a:xfrm>
+          <a:prstGeom prst="rect">
+            <a:avLst/>
+          </a:prstGeom>
+        </p:spPr>
+      </p:pic>
+    </p:spTree>
+    <p:extLst>
+      <p:ext uri="{BB962C8B-B14F-4D97-AF65-F5344CB8AC3E}">
+        <p14:creationId xmlns:p14="http://schemas.microsoft.com/office/powerpoint/2010/main" val="3787159420"/>
+      </p:ext>
+    </p:extLst>
+  </p:cSld>
+  <p:clrMapOvr>
+    <a:masterClrMapping/>
+  </p:clrMapOvr>
+</p:sld>
+</file>
+
+<file path=ppt/slides/slide39.xml><?xml version="1.0" encoding="utf-8"?>
+<p:sld xmlns:a="http://schemas.openxmlformats.org/drawingml/2006/main" xmlns:r="http://schemas.openxmlformats.org/officeDocument/2006/relationships" xmlns:p="http://schemas.openxmlformats.org/presentationml/2006/main">
+  <p:cSld>
+    <p:spTree>
+      <p:nvGrpSpPr>
+        <p:cNvPr id="1" name=""/>
+        <p:cNvGrpSpPr/>
+        <p:nvPr/>
+      </p:nvGrpSpPr>
+      <p:grpSpPr>
+        <a:xfrm>
+          <a:off x="0" y="0"/>
+          <a:ext cx="0" cy="0"/>
+          <a:chOff x="0" y="0"/>
+          <a:chExt cx="0" cy="0"/>
+        </a:xfrm>
+      </p:grpSpPr>
+      <p:sp>
+        <p:nvSpPr>
+          <p:cNvPr id="3" name="Title 2">
+            <a:extLst>
+              <a:ext uri="{FF2B5EF4-FFF2-40B4-BE49-F238E27FC236}">
+                <a16:creationId xmlns:a16="http://schemas.microsoft.com/office/drawing/2014/main" id="{CF7BEB60-5431-4A6D-B612-E03CEF9843D2}"/>
+              </a:ext>
+            </a:extLst>
+          </p:cNvPr>
+          <p:cNvSpPr>
+            <a:spLocks noGrp="1"/>
+          </p:cNvSpPr>
+          <p:nvPr>
+            <p:ph type="title"/>
+          </p:nvPr>
+        </p:nvSpPr>
+        <p:spPr>
+          <a:xfrm>
+            <a:off x="359228" y="0"/>
+            <a:ext cx="10600319" cy="861391"/>
+          </a:xfrm>
+          <a:solidFill>
+            <a:schemeClr val="accent6">
+              <a:lumMod val="75000"/>
+            </a:schemeClr>
+          </a:solidFill>
+          <a:ln/>
+        </p:spPr>
+        <p:style>
+          <a:lnRef idx="2">
+            <a:schemeClr val="dk1">
+              <a:shade val="50000"/>
+            </a:schemeClr>
+          </a:lnRef>
+          <a:fillRef idx="1">
+            <a:schemeClr val="dk1"/>
+          </a:fillRef>
+          <a:effectRef idx="0">
+            <a:schemeClr val="dk1"/>
+          </a:effectRef>
+          <a:fontRef idx="minor">
+            <a:schemeClr val="lt1"/>
+          </a:fontRef>
+        </p:style>
+        <p:txBody>
+          <a:bodyPr>
+            <a:noAutofit/>
+          </a:bodyPr>
+          <a:lstStyle/>
+          <a:p>
+            <a:pPr algn="ctr"/>
+            <a:r>
+              <a:rPr lang="en-US" sz="3000" dirty="0">
+                <a:solidFill>
+                  <a:schemeClr val="bg1"/>
+                </a:solidFill>
+              </a:rPr>
+              <a:t>ScatterPlot of Mileage vs Engine vs Power vs Transmission</a:t>
+            </a:r>
+          </a:p>
+        </p:txBody>
+      </p:sp>
+      <p:pic>
+        <p:nvPicPr>
+          <p:cNvPr id="4" name="Picture 3">
+            <a:extLst>
+              <a:ext uri="{FF2B5EF4-FFF2-40B4-BE49-F238E27FC236}">
+                <a16:creationId xmlns:a16="http://schemas.microsoft.com/office/drawing/2014/main" id="{A9F1BB8D-EC2F-4C86-BC00-A5576651BCE0}"/>
+              </a:ext>
+            </a:extLst>
+          </p:cNvPr>
+          <p:cNvPicPr>
+            <a:picLocks noChangeAspect="1"/>
+          </p:cNvPicPr>
+          <p:nvPr/>
+        </p:nvPicPr>
+        <p:blipFill>
+          <a:blip r:embed="rId2"/>
+          <a:stretch>
+            <a:fillRect/>
+          </a:stretch>
+        </p:blipFill>
+        <p:spPr>
+          <a:xfrm>
+            <a:off x="359228" y="698120"/>
+            <a:ext cx="11832772" cy="6159880"/>
+          </a:xfrm>
+          <a:prstGeom prst="rect">
+            <a:avLst/>
+          </a:prstGeom>
+        </p:spPr>
+      </p:pic>
+    </p:spTree>
+    <p:extLst>
+      <p:ext uri="{BB962C8B-B14F-4D97-AF65-F5344CB8AC3E}">
+        <p14:creationId xmlns:p14="http://schemas.microsoft.com/office/powerpoint/2010/main" val="4221797319"/>
       </p:ext>
     </p:extLst>
   </p:cSld>
@@ -18386,6 +19363,766 @@
     <p:extLst>
       <p:ext uri="{BB962C8B-B14F-4D97-AF65-F5344CB8AC3E}">
         <p14:creationId xmlns:p14="http://schemas.microsoft.com/office/powerpoint/2010/main" val="4154346938"/>
+      </p:ext>
+    </p:extLst>
+  </p:cSld>
+  <p:clrMapOvr>
+    <a:masterClrMapping/>
+  </p:clrMapOvr>
+</p:sld>
+</file>
+
+<file path=ppt/slides/slide40.xml><?xml version="1.0" encoding="utf-8"?>
+<p:sld xmlns:a="http://schemas.openxmlformats.org/drawingml/2006/main" xmlns:r="http://schemas.openxmlformats.org/officeDocument/2006/relationships" xmlns:p="http://schemas.openxmlformats.org/presentationml/2006/main">
+  <p:cSld>
+    <p:spTree>
+      <p:nvGrpSpPr>
+        <p:cNvPr id="1" name=""/>
+        <p:cNvGrpSpPr/>
+        <p:nvPr/>
+      </p:nvGrpSpPr>
+      <p:grpSpPr>
+        <a:xfrm>
+          <a:off x="0" y="0"/>
+          <a:ext cx="0" cy="0"/>
+          <a:chOff x="0" y="0"/>
+          <a:chExt cx="0" cy="0"/>
+        </a:xfrm>
+      </p:grpSpPr>
+      <p:sp>
+        <p:nvSpPr>
+          <p:cNvPr id="3" name="Title 2">
+            <a:extLst>
+              <a:ext uri="{FF2B5EF4-FFF2-40B4-BE49-F238E27FC236}">
+                <a16:creationId xmlns:a16="http://schemas.microsoft.com/office/drawing/2014/main" id="{CF7BEB60-5431-4A6D-B612-E03CEF9843D2}"/>
+              </a:ext>
+            </a:extLst>
+          </p:cNvPr>
+          <p:cNvSpPr>
+            <a:spLocks noGrp="1"/>
+          </p:cNvSpPr>
+          <p:nvPr>
+            <p:ph type="title"/>
+          </p:nvPr>
+        </p:nvSpPr>
+        <p:spPr>
+          <a:xfrm>
+            <a:off x="359228" y="0"/>
+            <a:ext cx="10600319" cy="861391"/>
+          </a:xfrm>
+          <a:solidFill>
+            <a:schemeClr val="accent6">
+              <a:lumMod val="75000"/>
+            </a:schemeClr>
+          </a:solidFill>
+          <a:ln/>
+        </p:spPr>
+        <p:style>
+          <a:lnRef idx="2">
+            <a:schemeClr val="dk1">
+              <a:shade val="50000"/>
+            </a:schemeClr>
+          </a:lnRef>
+          <a:fillRef idx="1">
+            <a:schemeClr val="dk1"/>
+          </a:fillRef>
+          <a:effectRef idx="0">
+            <a:schemeClr val="dk1"/>
+          </a:effectRef>
+          <a:fontRef idx="minor">
+            <a:schemeClr val="lt1"/>
+          </a:fontRef>
+        </p:style>
+        <p:txBody>
+          <a:bodyPr>
+            <a:noAutofit/>
+          </a:bodyPr>
+          <a:lstStyle/>
+          <a:p>
+            <a:pPr algn="ctr"/>
+            <a:r>
+              <a:rPr lang="en-US" sz="3000" dirty="0">
+                <a:solidFill>
+                  <a:schemeClr val="bg1"/>
+                </a:solidFill>
+              </a:rPr>
+              <a:t>ScatterPlot of Mileage vs Engine vs Seats vs Transmission</a:t>
+            </a:r>
+          </a:p>
+        </p:txBody>
+      </p:sp>
+      <p:pic>
+        <p:nvPicPr>
+          <p:cNvPr id="5" name="Picture 4">
+            <a:extLst>
+              <a:ext uri="{FF2B5EF4-FFF2-40B4-BE49-F238E27FC236}">
+                <a16:creationId xmlns:a16="http://schemas.microsoft.com/office/drawing/2014/main" id="{9F023D53-C544-45DA-96C5-F1C83AAD8DD0}"/>
+              </a:ext>
+            </a:extLst>
+          </p:cNvPr>
+          <p:cNvPicPr>
+            <a:picLocks noChangeAspect="1"/>
+          </p:cNvPicPr>
+          <p:nvPr/>
+        </p:nvPicPr>
+        <p:blipFill>
+          <a:blip r:embed="rId2"/>
+          <a:stretch>
+            <a:fillRect/>
+          </a:stretch>
+        </p:blipFill>
+        <p:spPr>
+          <a:xfrm>
+            <a:off x="359228" y="698120"/>
+            <a:ext cx="11832772" cy="6159880"/>
+          </a:xfrm>
+          <a:prstGeom prst="rect">
+            <a:avLst/>
+          </a:prstGeom>
+        </p:spPr>
+      </p:pic>
+    </p:spTree>
+    <p:extLst>
+      <p:ext uri="{BB962C8B-B14F-4D97-AF65-F5344CB8AC3E}">
+        <p14:creationId xmlns:p14="http://schemas.microsoft.com/office/powerpoint/2010/main" val="3240533115"/>
+      </p:ext>
+    </p:extLst>
+  </p:cSld>
+  <p:clrMapOvr>
+    <a:masterClrMapping/>
+  </p:clrMapOvr>
+</p:sld>
+</file>
+
+<file path=ppt/slides/slide41.xml><?xml version="1.0" encoding="utf-8"?>
+<p:sld xmlns:a="http://schemas.openxmlformats.org/drawingml/2006/main" xmlns:r="http://schemas.openxmlformats.org/officeDocument/2006/relationships" xmlns:p="http://schemas.openxmlformats.org/presentationml/2006/main">
+  <p:cSld>
+    <p:spTree>
+      <p:nvGrpSpPr>
+        <p:cNvPr id="1" name=""/>
+        <p:cNvGrpSpPr/>
+        <p:nvPr/>
+      </p:nvGrpSpPr>
+      <p:grpSpPr>
+        <a:xfrm>
+          <a:off x="0" y="0"/>
+          <a:ext cx="0" cy="0"/>
+          <a:chOff x="0" y="0"/>
+          <a:chExt cx="0" cy="0"/>
+        </a:xfrm>
+      </p:grpSpPr>
+      <p:sp>
+        <p:nvSpPr>
+          <p:cNvPr id="3" name="Title 2">
+            <a:extLst>
+              <a:ext uri="{FF2B5EF4-FFF2-40B4-BE49-F238E27FC236}">
+                <a16:creationId xmlns:a16="http://schemas.microsoft.com/office/drawing/2014/main" id="{CF7BEB60-5431-4A6D-B612-E03CEF9843D2}"/>
+              </a:ext>
+            </a:extLst>
+          </p:cNvPr>
+          <p:cNvSpPr>
+            <a:spLocks noGrp="1"/>
+          </p:cNvSpPr>
+          <p:nvPr>
+            <p:ph type="title"/>
+          </p:nvPr>
+        </p:nvSpPr>
+        <p:spPr>
+          <a:xfrm>
+            <a:off x="359228" y="0"/>
+            <a:ext cx="10600319" cy="861391"/>
+          </a:xfrm>
+          <a:solidFill>
+            <a:schemeClr val="accent6">
+              <a:lumMod val="75000"/>
+            </a:schemeClr>
+          </a:solidFill>
+          <a:ln/>
+        </p:spPr>
+        <p:style>
+          <a:lnRef idx="2">
+            <a:schemeClr val="dk1">
+              <a:shade val="50000"/>
+            </a:schemeClr>
+          </a:lnRef>
+          <a:fillRef idx="1">
+            <a:schemeClr val="dk1"/>
+          </a:fillRef>
+          <a:effectRef idx="0">
+            <a:schemeClr val="dk1"/>
+          </a:effectRef>
+          <a:fontRef idx="minor">
+            <a:schemeClr val="lt1"/>
+          </a:fontRef>
+        </p:style>
+        <p:txBody>
+          <a:bodyPr>
+            <a:noAutofit/>
+          </a:bodyPr>
+          <a:lstStyle/>
+          <a:p>
+            <a:pPr algn="ctr"/>
+            <a:r>
+              <a:rPr lang="en-US" sz="3000" dirty="0">
+                <a:solidFill>
+                  <a:schemeClr val="bg1"/>
+                </a:solidFill>
+              </a:rPr>
+              <a:t>BoxPlot of Mileage vs Fuel type vs Transmission</a:t>
+            </a:r>
+          </a:p>
+        </p:txBody>
+      </p:sp>
+      <p:pic>
+        <p:nvPicPr>
+          <p:cNvPr id="4" name="Picture 3">
+            <a:extLst>
+              <a:ext uri="{FF2B5EF4-FFF2-40B4-BE49-F238E27FC236}">
+                <a16:creationId xmlns:a16="http://schemas.microsoft.com/office/drawing/2014/main" id="{40D6B7D1-2B17-45BB-B4C4-C557A1A6C465}"/>
+              </a:ext>
+            </a:extLst>
+          </p:cNvPr>
+          <p:cNvPicPr>
+            <a:picLocks noChangeAspect="1"/>
+          </p:cNvPicPr>
+          <p:nvPr/>
+        </p:nvPicPr>
+        <p:blipFill>
+          <a:blip r:embed="rId2"/>
+          <a:stretch>
+            <a:fillRect/>
+          </a:stretch>
+        </p:blipFill>
+        <p:spPr>
+          <a:xfrm>
+            <a:off x="359228" y="698120"/>
+            <a:ext cx="11832772" cy="6159880"/>
+          </a:xfrm>
+          <a:prstGeom prst="rect">
+            <a:avLst/>
+          </a:prstGeom>
+        </p:spPr>
+      </p:pic>
+    </p:spTree>
+    <p:extLst>
+      <p:ext uri="{BB962C8B-B14F-4D97-AF65-F5344CB8AC3E}">
+        <p14:creationId xmlns:p14="http://schemas.microsoft.com/office/powerpoint/2010/main" val="1179795053"/>
+      </p:ext>
+    </p:extLst>
+  </p:cSld>
+  <p:clrMapOvr>
+    <a:masterClrMapping/>
+  </p:clrMapOvr>
+</p:sld>
+</file>
+
+<file path=ppt/slides/slide42.xml><?xml version="1.0" encoding="utf-8"?>
+<p:sld xmlns:a="http://schemas.openxmlformats.org/drawingml/2006/main" xmlns:r="http://schemas.openxmlformats.org/officeDocument/2006/relationships" xmlns:p="http://schemas.openxmlformats.org/presentationml/2006/main">
+  <p:cSld>
+    <p:spTree>
+      <p:nvGrpSpPr>
+        <p:cNvPr id="1" name=""/>
+        <p:cNvGrpSpPr/>
+        <p:nvPr/>
+      </p:nvGrpSpPr>
+      <p:grpSpPr>
+        <a:xfrm>
+          <a:off x="0" y="0"/>
+          <a:ext cx="0" cy="0"/>
+          <a:chOff x="0" y="0"/>
+          <a:chExt cx="0" cy="0"/>
+        </a:xfrm>
+      </p:grpSpPr>
+      <p:sp>
+        <p:nvSpPr>
+          <p:cNvPr id="3" name="Title 2">
+            <a:extLst>
+              <a:ext uri="{FF2B5EF4-FFF2-40B4-BE49-F238E27FC236}">
+                <a16:creationId xmlns:a16="http://schemas.microsoft.com/office/drawing/2014/main" id="{CF7BEB60-5431-4A6D-B612-E03CEF9843D2}"/>
+              </a:ext>
+            </a:extLst>
+          </p:cNvPr>
+          <p:cNvSpPr>
+            <a:spLocks noGrp="1"/>
+          </p:cNvSpPr>
+          <p:nvPr>
+            <p:ph type="title"/>
+          </p:nvPr>
+        </p:nvSpPr>
+        <p:spPr>
+          <a:xfrm>
+            <a:off x="359228" y="0"/>
+            <a:ext cx="10600319" cy="861391"/>
+          </a:xfrm>
+          <a:solidFill>
+            <a:schemeClr val="accent6">
+              <a:lumMod val="75000"/>
+            </a:schemeClr>
+          </a:solidFill>
+          <a:ln/>
+        </p:spPr>
+        <p:style>
+          <a:lnRef idx="2">
+            <a:schemeClr val="dk1">
+              <a:shade val="50000"/>
+            </a:schemeClr>
+          </a:lnRef>
+          <a:fillRef idx="1">
+            <a:schemeClr val="dk1"/>
+          </a:fillRef>
+          <a:effectRef idx="0">
+            <a:schemeClr val="dk1"/>
+          </a:effectRef>
+          <a:fontRef idx="minor">
+            <a:schemeClr val="lt1"/>
+          </a:fontRef>
+        </p:style>
+        <p:txBody>
+          <a:bodyPr>
+            <a:noAutofit/>
+          </a:bodyPr>
+          <a:lstStyle/>
+          <a:p>
+            <a:pPr algn="ctr"/>
+            <a:r>
+              <a:rPr lang="en-US" sz="3000" dirty="0">
+                <a:solidFill>
+                  <a:schemeClr val="bg1"/>
+                </a:solidFill>
+              </a:rPr>
+              <a:t>BoxPlot of Mileage vs Seats vs Transmission</a:t>
+            </a:r>
+          </a:p>
+        </p:txBody>
+      </p:sp>
+      <p:pic>
+        <p:nvPicPr>
+          <p:cNvPr id="5" name="Picture 4">
+            <a:extLst>
+              <a:ext uri="{FF2B5EF4-FFF2-40B4-BE49-F238E27FC236}">
+                <a16:creationId xmlns:a16="http://schemas.microsoft.com/office/drawing/2014/main" id="{F54F0634-BEAD-4DC6-9C29-C9DF4530AC2B}"/>
+              </a:ext>
+            </a:extLst>
+          </p:cNvPr>
+          <p:cNvPicPr>
+            <a:picLocks noChangeAspect="1"/>
+          </p:cNvPicPr>
+          <p:nvPr/>
+        </p:nvPicPr>
+        <p:blipFill>
+          <a:blip r:embed="rId2"/>
+          <a:stretch>
+            <a:fillRect/>
+          </a:stretch>
+        </p:blipFill>
+        <p:spPr>
+          <a:xfrm>
+            <a:off x="359228" y="698120"/>
+            <a:ext cx="11832772" cy="6159880"/>
+          </a:xfrm>
+          <a:prstGeom prst="rect">
+            <a:avLst/>
+          </a:prstGeom>
+        </p:spPr>
+      </p:pic>
+    </p:spTree>
+    <p:extLst>
+      <p:ext uri="{BB962C8B-B14F-4D97-AF65-F5344CB8AC3E}">
+        <p14:creationId xmlns:p14="http://schemas.microsoft.com/office/powerpoint/2010/main" val="1237182796"/>
+      </p:ext>
+    </p:extLst>
+  </p:cSld>
+  <p:clrMapOvr>
+    <a:masterClrMapping/>
+  </p:clrMapOvr>
+</p:sld>
+</file>
+
+<file path=ppt/slides/slide43.xml><?xml version="1.0" encoding="utf-8"?>
+<p:sld xmlns:a="http://schemas.openxmlformats.org/drawingml/2006/main" xmlns:r="http://schemas.openxmlformats.org/officeDocument/2006/relationships" xmlns:p="http://schemas.openxmlformats.org/presentationml/2006/main">
+  <p:cSld>
+    <p:spTree>
+      <p:nvGrpSpPr>
+        <p:cNvPr id="1" name=""/>
+        <p:cNvGrpSpPr/>
+        <p:nvPr/>
+      </p:nvGrpSpPr>
+      <p:grpSpPr>
+        <a:xfrm>
+          <a:off x="0" y="0"/>
+          <a:ext cx="0" cy="0"/>
+          <a:chOff x="0" y="0"/>
+          <a:chExt cx="0" cy="0"/>
+        </a:xfrm>
+      </p:grpSpPr>
+      <p:sp>
+        <p:nvSpPr>
+          <p:cNvPr id="3" name="Title 2">
+            <a:extLst>
+              <a:ext uri="{FF2B5EF4-FFF2-40B4-BE49-F238E27FC236}">
+                <a16:creationId xmlns:a16="http://schemas.microsoft.com/office/drawing/2014/main" id="{CF7BEB60-5431-4A6D-B612-E03CEF9843D2}"/>
+              </a:ext>
+            </a:extLst>
+          </p:cNvPr>
+          <p:cNvSpPr>
+            <a:spLocks noGrp="1"/>
+          </p:cNvSpPr>
+          <p:nvPr>
+            <p:ph type="title"/>
+          </p:nvPr>
+        </p:nvSpPr>
+        <p:spPr>
+          <a:xfrm>
+            <a:off x="359228" y="0"/>
+            <a:ext cx="10600319" cy="861391"/>
+          </a:xfrm>
+          <a:solidFill>
+            <a:schemeClr val="accent6">
+              <a:lumMod val="75000"/>
+            </a:schemeClr>
+          </a:solidFill>
+          <a:ln/>
+        </p:spPr>
+        <p:style>
+          <a:lnRef idx="2">
+            <a:schemeClr val="dk1">
+              <a:shade val="50000"/>
+            </a:schemeClr>
+          </a:lnRef>
+          <a:fillRef idx="1">
+            <a:schemeClr val="dk1"/>
+          </a:fillRef>
+          <a:effectRef idx="0">
+            <a:schemeClr val="dk1"/>
+          </a:effectRef>
+          <a:fontRef idx="minor">
+            <a:schemeClr val="lt1"/>
+          </a:fontRef>
+        </p:style>
+        <p:txBody>
+          <a:bodyPr>
+            <a:noAutofit/>
+          </a:bodyPr>
+          <a:lstStyle/>
+          <a:p>
+            <a:pPr algn="ctr"/>
+            <a:r>
+              <a:rPr lang="en-US" sz="3000" dirty="0">
+                <a:solidFill>
+                  <a:schemeClr val="bg1"/>
+                </a:solidFill>
+              </a:rPr>
+              <a:t>BoxPlot of Engine vs Power vs Fuel type vs Transmission</a:t>
+            </a:r>
+          </a:p>
+        </p:txBody>
+      </p:sp>
+      <p:pic>
+        <p:nvPicPr>
+          <p:cNvPr id="5" name="Picture 4">
+            <a:extLst>
+              <a:ext uri="{FF2B5EF4-FFF2-40B4-BE49-F238E27FC236}">
+                <a16:creationId xmlns:a16="http://schemas.microsoft.com/office/drawing/2014/main" id="{47F489A8-118F-43E6-BDC5-E6717D981817}"/>
+              </a:ext>
+            </a:extLst>
+          </p:cNvPr>
+          <p:cNvPicPr>
+            <a:picLocks noChangeAspect="1"/>
+          </p:cNvPicPr>
+          <p:nvPr/>
+        </p:nvPicPr>
+        <p:blipFill rotWithShape="1">
+          <a:blip r:embed="rId2"/>
+          <a:srcRect t="3469"/>
+          <a:stretch/>
+        </p:blipFill>
+        <p:spPr>
+          <a:xfrm>
+            <a:off x="0" y="610843"/>
+            <a:ext cx="6096000" cy="6206365"/>
+          </a:xfrm>
+          <a:prstGeom prst="rect">
+            <a:avLst/>
+          </a:prstGeom>
+        </p:spPr>
+      </p:pic>
+      <p:pic>
+        <p:nvPicPr>
+          <p:cNvPr id="11" name="Picture 10">
+            <a:extLst>
+              <a:ext uri="{FF2B5EF4-FFF2-40B4-BE49-F238E27FC236}">
+                <a16:creationId xmlns:a16="http://schemas.microsoft.com/office/drawing/2014/main" id="{3B5C23F1-3150-49BE-BA06-DB9158581694}"/>
+              </a:ext>
+            </a:extLst>
+          </p:cNvPr>
+          <p:cNvPicPr>
+            <a:picLocks noChangeAspect="1"/>
+          </p:cNvPicPr>
+          <p:nvPr/>
+        </p:nvPicPr>
+        <p:blipFill rotWithShape="1">
+          <a:blip r:embed="rId3"/>
+          <a:srcRect t="3469"/>
+          <a:stretch/>
+        </p:blipFill>
+        <p:spPr>
+          <a:xfrm>
+            <a:off x="6096000" y="610843"/>
+            <a:ext cx="5991225" cy="6206365"/>
+          </a:xfrm>
+          <a:prstGeom prst="rect">
+            <a:avLst/>
+          </a:prstGeom>
+        </p:spPr>
+      </p:pic>
+    </p:spTree>
+    <p:extLst>
+      <p:ext uri="{BB962C8B-B14F-4D97-AF65-F5344CB8AC3E}">
+        <p14:creationId xmlns:p14="http://schemas.microsoft.com/office/powerpoint/2010/main" val="368628171"/>
+      </p:ext>
+    </p:extLst>
+  </p:cSld>
+  <p:clrMapOvr>
+    <a:masterClrMapping/>
+  </p:clrMapOvr>
+</p:sld>
+</file>
+
+<file path=ppt/slides/slide44.xml><?xml version="1.0" encoding="utf-8"?>
+<p:sld xmlns:a="http://schemas.openxmlformats.org/drawingml/2006/main" xmlns:r="http://schemas.openxmlformats.org/officeDocument/2006/relationships" xmlns:p="http://schemas.openxmlformats.org/presentationml/2006/main">
+  <p:cSld>
+    <p:spTree>
+      <p:nvGrpSpPr>
+        <p:cNvPr id="1" name=""/>
+        <p:cNvGrpSpPr/>
+        <p:nvPr/>
+      </p:nvGrpSpPr>
+      <p:grpSpPr>
+        <a:xfrm>
+          <a:off x="0" y="0"/>
+          <a:ext cx="0" cy="0"/>
+          <a:chOff x="0" y="0"/>
+          <a:chExt cx="0" cy="0"/>
+        </a:xfrm>
+      </p:grpSpPr>
+      <p:sp>
+        <p:nvSpPr>
+          <p:cNvPr id="3" name="Title 2">
+            <a:extLst>
+              <a:ext uri="{FF2B5EF4-FFF2-40B4-BE49-F238E27FC236}">
+                <a16:creationId xmlns:a16="http://schemas.microsoft.com/office/drawing/2014/main" id="{CF7BEB60-5431-4A6D-B612-E03CEF9843D2}"/>
+              </a:ext>
+            </a:extLst>
+          </p:cNvPr>
+          <p:cNvSpPr>
+            <a:spLocks noGrp="1"/>
+          </p:cNvSpPr>
+          <p:nvPr>
+            <p:ph type="title"/>
+          </p:nvPr>
+        </p:nvSpPr>
+        <p:spPr>
+          <a:xfrm>
+            <a:off x="359228" y="0"/>
+            <a:ext cx="10600319" cy="861391"/>
+          </a:xfrm>
+          <a:solidFill>
+            <a:schemeClr val="accent6">
+              <a:lumMod val="75000"/>
+            </a:schemeClr>
+          </a:solidFill>
+          <a:ln/>
+        </p:spPr>
+        <p:style>
+          <a:lnRef idx="2">
+            <a:schemeClr val="dk1">
+              <a:shade val="50000"/>
+            </a:schemeClr>
+          </a:lnRef>
+          <a:fillRef idx="1">
+            <a:schemeClr val="dk1"/>
+          </a:fillRef>
+          <a:effectRef idx="0">
+            <a:schemeClr val="dk1"/>
+          </a:effectRef>
+          <a:fontRef idx="minor">
+            <a:schemeClr val="lt1"/>
+          </a:fontRef>
+        </p:style>
+        <p:txBody>
+          <a:bodyPr>
+            <a:noAutofit/>
+          </a:bodyPr>
+          <a:lstStyle/>
+          <a:p>
+            <a:pPr algn="ctr"/>
+            <a:r>
+              <a:rPr lang="en-US" sz="3000" dirty="0">
+                <a:solidFill>
+                  <a:schemeClr val="bg1"/>
+                </a:solidFill>
+              </a:rPr>
+              <a:t>BoxPlot of Power vs Seats vs Transmission</a:t>
+            </a:r>
+          </a:p>
+        </p:txBody>
+      </p:sp>
+      <p:pic>
+        <p:nvPicPr>
+          <p:cNvPr id="7" name="Picture 6">
+            <a:extLst>
+              <a:ext uri="{FF2B5EF4-FFF2-40B4-BE49-F238E27FC236}">
+                <a16:creationId xmlns:a16="http://schemas.microsoft.com/office/drawing/2014/main" id="{2544952F-26B6-4BEC-9474-635B4A9ACB71}"/>
+              </a:ext>
+            </a:extLst>
+          </p:cNvPr>
+          <p:cNvPicPr>
+            <a:picLocks noChangeAspect="1"/>
+          </p:cNvPicPr>
+          <p:nvPr/>
+        </p:nvPicPr>
+        <p:blipFill>
+          <a:blip r:embed="rId2"/>
+          <a:stretch>
+            <a:fillRect/>
+          </a:stretch>
+        </p:blipFill>
+        <p:spPr>
+          <a:xfrm>
+            <a:off x="359228" y="698120"/>
+            <a:ext cx="11832772" cy="6159880"/>
+          </a:xfrm>
+          <a:prstGeom prst="rect">
+            <a:avLst/>
+          </a:prstGeom>
+        </p:spPr>
+      </p:pic>
+    </p:spTree>
+    <p:extLst>
+      <p:ext uri="{BB962C8B-B14F-4D97-AF65-F5344CB8AC3E}">
+        <p14:creationId xmlns:p14="http://schemas.microsoft.com/office/powerpoint/2010/main" val="984444175"/>
+      </p:ext>
+    </p:extLst>
+  </p:cSld>
+  <p:clrMapOvr>
+    <a:masterClrMapping/>
+  </p:clrMapOvr>
+</p:sld>
+</file>
+
+<file path=ppt/slides/slide45.xml><?xml version="1.0" encoding="utf-8"?>
+<p:sld xmlns:a="http://schemas.openxmlformats.org/drawingml/2006/main" xmlns:r="http://schemas.openxmlformats.org/officeDocument/2006/relationships" xmlns:p="http://schemas.openxmlformats.org/presentationml/2006/main">
+  <p:cSld>
+    <p:spTree>
+      <p:nvGrpSpPr>
+        <p:cNvPr id="1" name=""/>
+        <p:cNvGrpSpPr/>
+        <p:nvPr/>
+      </p:nvGrpSpPr>
+      <p:grpSpPr>
+        <a:xfrm>
+          <a:off x="0" y="0"/>
+          <a:ext cx="0" cy="0"/>
+          <a:chOff x="0" y="0"/>
+          <a:chExt cx="0" cy="0"/>
+        </a:xfrm>
+      </p:grpSpPr>
+      <p:sp>
+        <p:nvSpPr>
+          <p:cNvPr id="3" name="Title 2">
+            <a:extLst>
+              <a:ext uri="{FF2B5EF4-FFF2-40B4-BE49-F238E27FC236}">
+                <a16:creationId xmlns:a16="http://schemas.microsoft.com/office/drawing/2014/main" id="{CF7BEB60-5431-4A6D-B612-E03CEF9843D2}"/>
+              </a:ext>
+            </a:extLst>
+          </p:cNvPr>
+          <p:cNvSpPr>
+            <a:spLocks noGrp="1"/>
+          </p:cNvSpPr>
+          <p:nvPr>
+            <p:ph type="title"/>
+          </p:nvPr>
+        </p:nvSpPr>
+        <p:spPr>
+          <a:xfrm>
+            <a:off x="359228" y="0"/>
+            <a:ext cx="10600319" cy="861391"/>
+          </a:xfrm>
+          <a:solidFill>
+            <a:schemeClr val="accent6">
+              <a:lumMod val="75000"/>
+            </a:schemeClr>
+          </a:solidFill>
+          <a:ln/>
+        </p:spPr>
+        <p:style>
+          <a:lnRef idx="2">
+            <a:schemeClr val="dk1">
+              <a:shade val="50000"/>
+            </a:schemeClr>
+          </a:lnRef>
+          <a:fillRef idx="1">
+            <a:schemeClr val="dk1"/>
+          </a:fillRef>
+          <a:effectRef idx="0">
+            <a:schemeClr val="dk1"/>
+          </a:effectRef>
+          <a:fontRef idx="minor">
+            <a:schemeClr val="lt1"/>
+          </a:fontRef>
+        </p:style>
+        <p:txBody>
+          <a:bodyPr>
+            <a:noAutofit/>
+          </a:bodyPr>
+          <a:lstStyle/>
+          <a:p>
+            <a:pPr algn="ctr"/>
+            <a:r>
+              <a:rPr lang="en-US" sz="3000" dirty="0">
+                <a:solidFill>
+                  <a:schemeClr val="bg1"/>
+                </a:solidFill>
+              </a:rPr>
+              <a:t>BoxPlot of Price vs Seats vs Transmission</a:t>
+            </a:r>
+          </a:p>
+        </p:txBody>
+      </p:sp>
+      <p:pic>
+        <p:nvPicPr>
+          <p:cNvPr id="4" name="Picture 3">
+            <a:extLst>
+              <a:ext uri="{FF2B5EF4-FFF2-40B4-BE49-F238E27FC236}">
+                <a16:creationId xmlns:a16="http://schemas.microsoft.com/office/drawing/2014/main" id="{8717AB97-BBA1-461D-BA38-1283E68ECB0A}"/>
+              </a:ext>
+            </a:extLst>
+          </p:cNvPr>
+          <p:cNvPicPr>
+            <a:picLocks noChangeAspect="1"/>
+          </p:cNvPicPr>
+          <p:nvPr/>
+        </p:nvPicPr>
+        <p:blipFill>
+          <a:blip r:embed="rId2"/>
+          <a:stretch>
+            <a:fillRect/>
+          </a:stretch>
+        </p:blipFill>
+        <p:spPr>
+          <a:xfrm>
+            <a:off x="359228" y="698120"/>
+            <a:ext cx="11832772" cy="6159880"/>
+          </a:xfrm>
+          <a:prstGeom prst="rect">
+            <a:avLst/>
+          </a:prstGeom>
+        </p:spPr>
+      </p:pic>
+    </p:spTree>
+    <p:extLst>
+      <p:ext uri="{BB962C8B-B14F-4D97-AF65-F5344CB8AC3E}">
+        <p14:creationId xmlns:p14="http://schemas.microsoft.com/office/powerpoint/2010/main" val="197030706"/>
       </p:ext>
     </p:extLst>
   </p:cSld>
@@ -19929,6 +21666,23 @@
 </file>
 
 <file path=customXml/item1.xml><?xml version="1.0" encoding="utf-8"?>
+<?mso-contentType ?>
+<FormTemplates xmlns="http://schemas.microsoft.com/sharepoint/v3/contenttype/forms">
+  <Display>DocumentLibraryForm</Display>
+  <Edit>DocumentLibraryForm</Edit>
+  <New>DocumentLibraryForm</New>
+</FormTemplates>
+</file>
+
+<file path=customXml/item2.xml><?xml version="1.0" encoding="utf-8"?>
+<p:properties xmlns:p="http://schemas.microsoft.com/office/2006/metadata/properties" xmlns:xsi="http://www.w3.org/2001/XMLSchema-instance" xmlns:pc="http://schemas.microsoft.com/office/infopath/2007/PartnerControls">
+  <documentManagement>
+    <MediaServiceKeyPoints xmlns="71af3243-3dd4-4a8d-8c0d-dd76da1f02a5" xsi:nil="true"/>
+  </documentManagement>
+</p:properties>
+</file>
+
+<file path=customXml/item3.xml><?xml version="1.0" encoding="utf-8"?>
 <ct:contentTypeSchema xmlns:ct="http://schemas.microsoft.com/office/2006/metadata/contentType" xmlns:ma="http://schemas.microsoft.com/office/2006/metadata/properties/metaAttributes" ct:_="" ma:_="" ma:contentTypeName="Document" ma:contentTypeID="0x01010079F111ED35F8CC479449609E8A0923A6" ma:contentTypeVersion="11" ma:contentTypeDescription="Create a new document." ma:contentTypeScope="" ma:versionID="96291512c1ee715ab617f4c07df79fc1">
   <xsd:schema xmlns:xsd="http://www.w3.org/2001/XMLSchema" xmlns:xs="http://www.w3.org/2001/XMLSchema" xmlns:p="http://schemas.microsoft.com/office/2006/metadata/properties" xmlns:ns2="71af3243-3dd4-4a8d-8c0d-dd76da1f02a5" xmlns:ns3="16c05727-aa75-4e4a-9b5f-8a80a1165891" targetNamespace="http://schemas.microsoft.com/office/2006/metadata/properties" ma:root="true" ma:fieldsID="8256c27c40ca5c40ce1cf6c44f0205df" ns2:_="" ns3:_="">
     <xsd:import namespace="71af3243-3dd4-4a8d-8c0d-dd76da1f02a5"/>
@@ -20139,24 +21893,25 @@
 </ct:contentTypeSchema>
 </file>
 
-<file path=customXml/item2.xml><?xml version="1.0" encoding="utf-8"?>
-<p:properties xmlns:p="http://schemas.microsoft.com/office/2006/metadata/properties" xmlns:xsi="http://www.w3.org/2001/XMLSchema-instance" xmlns:pc="http://schemas.microsoft.com/office/infopath/2007/PartnerControls">
-  <documentManagement>
-    <MediaServiceKeyPoints xmlns="71af3243-3dd4-4a8d-8c0d-dd76da1f02a5" xsi:nil="true"/>
-  </documentManagement>
-</p:properties>
+<file path=customXml/itemProps1.xml><?xml version="1.0" encoding="utf-8"?>
+<ds:datastoreItem xmlns:ds="http://schemas.openxmlformats.org/officeDocument/2006/customXml" ds:itemID="{AB759597-1FA4-4F46-9BA8-01240C56026E}">
+  <ds:schemaRefs>
+    <ds:schemaRef ds:uri="http://schemas.microsoft.com/sharepoint/v3/contenttype/forms"/>
+  </ds:schemaRefs>
+</ds:datastoreItem>
 </file>
 
-<file path=customXml/item3.xml><?xml version="1.0" encoding="utf-8"?>
-<?mso-contentType ?>
-<FormTemplates xmlns="http://schemas.microsoft.com/sharepoint/v3/contenttype/forms">
-  <Display>DocumentLibraryForm</Display>
-  <Edit>DocumentLibraryForm</Edit>
-  <New>DocumentLibraryForm</New>
-</FormTemplates>
+<file path=customXml/itemProps2.xml><?xml version="1.0" encoding="utf-8"?>
+<ds:datastoreItem xmlns:ds="http://schemas.openxmlformats.org/officeDocument/2006/customXml" ds:itemID="{2940343A-75DB-4E03-95EA-4A75BA0D7FF2}">
+  <ds:schemaRefs>
+    <ds:schemaRef ds:uri="http://schemas.microsoft.com/office/2006/metadata/properties"/>
+    <ds:schemaRef ds:uri="http://schemas.microsoft.com/office/infopath/2007/PartnerControls"/>
+    <ds:schemaRef ds:uri="71af3243-3dd4-4a8d-8c0d-dd76da1f02a5"/>
+  </ds:schemaRefs>
+</ds:datastoreItem>
 </file>
 
-<file path=customXml/itemProps1.xml><?xml version="1.0" encoding="utf-8"?>
+<file path=customXml/itemProps3.xml><?xml version="1.0" encoding="utf-8"?>
 <ds:datastoreItem xmlns:ds="http://schemas.openxmlformats.org/officeDocument/2006/customXml" ds:itemID="{C9C3589D-EF2D-4AF3-8B55-088F4B14D6E1}">
   <ds:schemaRefs>
     <ds:schemaRef ds:uri="http://schemas.microsoft.com/office/2006/metadata/contentType"/>
@@ -20173,22 +21928,4 @@
     <ds:schemaRef ds:uri="http://schemas.microsoft.com/internal/obd"/>
   </ds:schemaRefs>
 </ds:datastoreItem>
-</file>
-
-<file path=customXml/itemProps2.xml><?xml version="1.0" encoding="utf-8"?>
-<ds:datastoreItem xmlns:ds="http://schemas.openxmlformats.org/officeDocument/2006/customXml" ds:itemID="{2940343A-75DB-4E03-95EA-4A75BA0D7FF2}">
-  <ds:schemaRefs>
-    <ds:schemaRef ds:uri="http://schemas.microsoft.com/office/2006/metadata/properties"/>
-    <ds:schemaRef ds:uri="http://schemas.microsoft.com/office/infopath/2007/PartnerControls"/>
-    <ds:schemaRef ds:uri="71af3243-3dd4-4a8d-8c0d-dd76da1f02a5"/>
-  </ds:schemaRefs>
-</ds:datastoreItem>
-</file>
-
-<file path=customXml/itemProps3.xml><?xml version="1.0" encoding="utf-8"?>
-<ds:datastoreItem xmlns:ds="http://schemas.openxmlformats.org/officeDocument/2006/customXml" ds:itemID="{AB759597-1FA4-4F46-9BA8-01240C56026E}">
-  <ds:schemaRefs>
-    <ds:schemaRef ds:uri="http://schemas.microsoft.com/sharepoint/v3/contenttype/forms"/>
-  </ds:schemaRefs>
-</ds:datastoreItem>
 </file>
</xml_diff>